<commit_message>
Updated the slides for the roles, sequence diagram , state chart and component diagram
</commit_message>
<xml_diff>
--- a/docs/QUICK_RESCUE_BOT.pptx
+++ b/docs/QUICK_RESCUE_BOT.pptx
@@ -5,7 +5,7 @@
     <p:sldMasterId id="2147483648" r:id="rId1"/>
   </p:sldMasterIdLst>
   <p:notesMasterIdLst>
-    <p:notesMasterId r:id="rId24"/>
+    <p:notesMasterId r:id="rId30"/>
   </p:notesMasterIdLst>
   <p:sldIdLst>
     <p:sldId id="256" r:id="rId2"/>
@@ -14,22 +14,28 @@
     <p:sldId id="258" r:id="rId5"/>
     <p:sldId id="259" r:id="rId6"/>
     <p:sldId id="260" r:id="rId7"/>
-    <p:sldId id="261" r:id="rId8"/>
-    <p:sldId id="262" r:id="rId9"/>
-    <p:sldId id="263" r:id="rId10"/>
-    <p:sldId id="264" r:id="rId11"/>
-    <p:sldId id="265" r:id="rId12"/>
-    <p:sldId id="266" r:id="rId13"/>
-    <p:sldId id="273" r:id="rId14"/>
-    <p:sldId id="268" r:id="rId15"/>
-    <p:sldId id="274" r:id="rId16"/>
+    <p:sldId id="278" r:id="rId8"/>
+    <p:sldId id="279" r:id="rId9"/>
+    <p:sldId id="280" r:id="rId10"/>
+    <p:sldId id="262" r:id="rId11"/>
+    <p:sldId id="281" r:id="rId12"/>
+    <p:sldId id="263" r:id="rId13"/>
+    <p:sldId id="265" r:id="rId14"/>
+    <p:sldId id="264" r:id="rId15"/>
+    <p:sldId id="286" r:id="rId16"/>
     <p:sldId id="269" r:id="rId17"/>
-    <p:sldId id="275" r:id="rId18"/>
-    <p:sldId id="276" r:id="rId19"/>
-    <p:sldId id="267" r:id="rId20"/>
-    <p:sldId id="277" r:id="rId21"/>
-    <p:sldId id="270" r:id="rId22"/>
-    <p:sldId id="271" r:id="rId23"/>
+    <p:sldId id="282" r:id="rId18"/>
+    <p:sldId id="285" r:id="rId19"/>
+    <p:sldId id="275" r:id="rId20"/>
+    <p:sldId id="283" r:id="rId21"/>
+    <p:sldId id="277" r:id="rId22"/>
+    <p:sldId id="268" r:id="rId23"/>
+    <p:sldId id="266" r:id="rId24"/>
+    <p:sldId id="284" r:id="rId25"/>
+    <p:sldId id="273" r:id="rId26"/>
+    <p:sldId id="267" r:id="rId27"/>
+    <p:sldId id="270" r:id="rId28"/>
+    <p:sldId id="271" r:id="rId29"/>
   </p:sldIdLst>
   <p:sldSz cx="12192000" cy="6858000"/>
   <p:notesSz cx="6858000" cy="9144000"/>
@@ -185,7 +191,7 @@
             </a:lvl1pPr>
           </a:lstStyle>
           <a:p>
-            <a:endParaRPr lang="en-IN"/>
+            <a:endParaRPr lang="en-IN" dirty="0"/>
           </a:p>
         </p:txBody>
       </p:sp>
@@ -218,9 +224,9 @@
           <a:p>
             <a:fld id="{77031EA3-66E8-4A20-BA83-0E6EA5C045C2}" type="datetimeFigureOut">
               <a:rPr lang="en-IN" smtClean="0"/>
-              <a:t>30-06-2020</a:t>
+              <a:t>03-07-2020</a:t>
             </a:fld>
-            <a:endParaRPr lang="en-IN"/>
+            <a:endParaRPr lang="en-IN" dirty="0"/>
           </a:p>
         </p:txBody>
       </p:sp>
@@ -253,7 +259,7 @@
           <a:bodyPr vert="horz" lIns="91440" tIns="45720" rIns="91440" bIns="45720" rtlCol="0" anchor="ctr"/>
           <a:lstStyle/>
           <a:p>
-            <a:endParaRPr lang="en-IN"/>
+            <a:endParaRPr lang="en-IN" dirty="0"/>
           </a:p>
         </p:txBody>
       </p:sp>
@@ -344,7 +350,7 @@
             </a:lvl1pPr>
           </a:lstStyle>
           <a:p>
-            <a:endParaRPr lang="en-IN"/>
+            <a:endParaRPr lang="en-IN" dirty="0"/>
           </a:p>
         </p:txBody>
       </p:sp>
@@ -379,7 +385,7 @@
               <a:rPr lang="en-IN" smtClean="0"/>
               <a:t>‹#›</a:t>
             </a:fld>
-            <a:endParaRPr lang="en-IN"/>
+            <a:endParaRPr lang="en-IN" dirty="0"/>
           </a:p>
         </p:txBody>
       </p:sp>
@@ -635,9 +641,9 @@
           <a:p>
             <a:fld id="{95DF318F-AFED-48B5-A4C9-12E25A0AA439}" type="datetimeFigureOut">
               <a:rPr lang="en-IN" smtClean="0"/>
-              <a:t>30-06-2020</a:t>
+              <a:t>03-07-2020</a:t>
             </a:fld>
-            <a:endParaRPr lang="en-IN"/>
+            <a:endParaRPr lang="en-IN" dirty="0"/>
           </a:p>
         </p:txBody>
       </p:sp>
@@ -662,7 +668,7 @@
           <a:bodyPr/>
           <a:lstStyle/>
           <a:p>
-            <a:endParaRPr lang="en-IN"/>
+            <a:endParaRPr lang="en-IN" dirty="0"/>
           </a:p>
         </p:txBody>
       </p:sp>
@@ -691,7 +697,7 @@
               <a:rPr lang="en-IN" smtClean="0"/>
               <a:t>‹#›</a:t>
             </a:fld>
-            <a:endParaRPr lang="en-IN"/>
+            <a:endParaRPr lang="en-IN" dirty="0"/>
           </a:p>
         </p:txBody>
       </p:sp>
@@ -835,9 +841,9 @@
           <a:p>
             <a:fld id="{95DF318F-AFED-48B5-A4C9-12E25A0AA439}" type="datetimeFigureOut">
               <a:rPr lang="en-IN" smtClean="0"/>
-              <a:t>30-06-2020</a:t>
+              <a:t>03-07-2020</a:t>
             </a:fld>
-            <a:endParaRPr lang="en-IN"/>
+            <a:endParaRPr lang="en-IN" dirty="0"/>
           </a:p>
         </p:txBody>
       </p:sp>
@@ -862,7 +868,7 @@
           <a:bodyPr/>
           <a:lstStyle/>
           <a:p>
-            <a:endParaRPr lang="en-IN"/>
+            <a:endParaRPr lang="en-IN" dirty="0"/>
           </a:p>
         </p:txBody>
       </p:sp>
@@ -891,7 +897,7 @@
               <a:rPr lang="en-IN" smtClean="0"/>
               <a:t>‹#›</a:t>
             </a:fld>
-            <a:endParaRPr lang="en-IN"/>
+            <a:endParaRPr lang="en-IN" dirty="0"/>
           </a:p>
         </p:txBody>
       </p:sp>
@@ -1045,9 +1051,9 @@
           <a:p>
             <a:fld id="{95DF318F-AFED-48B5-A4C9-12E25A0AA439}" type="datetimeFigureOut">
               <a:rPr lang="en-IN" smtClean="0"/>
-              <a:t>30-06-2020</a:t>
+              <a:t>03-07-2020</a:t>
             </a:fld>
-            <a:endParaRPr lang="en-IN"/>
+            <a:endParaRPr lang="en-IN" dirty="0"/>
           </a:p>
         </p:txBody>
       </p:sp>
@@ -1072,7 +1078,7 @@
           <a:bodyPr/>
           <a:lstStyle/>
           <a:p>
-            <a:endParaRPr lang="en-IN"/>
+            <a:endParaRPr lang="en-IN" dirty="0"/>
           </a:p>
         </p:txBody>
       </p:sp>
@@ -1101,7 +1107,7 @@
               <a:rPr lang="en-IN" smtClean="0"/>
               <a:t>‹#›</a:t>
             </a:fld>
-            <a:endParaRPr lang="en-IN"/>
+            <a:endParaRPr lang="en-IN" dirty="0"/>
           </a:p>
         </p:txBody>
       </p:sp>
@@ -1245,9 +1251,9 @@
           <a:p>
             <a:fld id="{95DF318F-AFED-48B5-A4C9-12E25A0AA439}" type="datetimeFigureOut">
               <a:rPr lang="en-IN" smtClean="0"/>
-              <a:t>30-06-2020</a:t>
+              <a:t>03-07-2020</a:t>
             </a:fld>
-            <a:endParaRPr lang="en-IN"/>
+            <a:endParaRPr lang="en-IN" dirty="0"/>
           </a:p>
         </p:txBody>
       </p:sp>
@@ -1272,7 +1278,7 @@
           <a:bodyPr/>
           <a:lstStyle/>
           <a:p>
-            <a:endParaRPr lang="en-IN"/>
+            <a:endParaRPr lang="en-IN" dirty="0"/>
           </a:p>
         </p:txBody>
       </p:sp>
@@ -1301,7 +1307,7 @@
               <a:rPr lang="en-IN" smtClean="0"/>
               <a:t>‹#›</a:t>
             </a:fld>
-            <a:endParaRPr lang="en-IN"/>
+            <a:endParaRPr lang="en-IN" dirty="0"/>
           </a:p>
         </p:txBody>
       </p:sp>
@@ -1521,9 +1527,9 @@
           <a:p>
             <a:fld id="{95DF318F-AFED-48B5-A4C9-12E25A0AA439}" type="datetimeFigureOut">
               <a:rPr lang="en-IN" smtClean="0"/>
-              <a:t>30-06-2020</a:t>
+              <a:t>03-07-2020</a:t>
             </a:fld>
-            <a:endParaRPr lang="en-IN"/>
+            <a:endParaRPr lang="en-IN" dirty="0"/>
           </a:p>
         </p:txBody>
       </p:sp>
@@ -1548,7 +1554,7 @@
           <a:bodyPr/>
           <a:lstStyle/>
           <a:p>
-            <a:endParaRPr lang="en-IN"/>
+            <a:endParaRPr lang="en-IN" dirty="0"/>
           </a:p>
         </p:txBody>
       </p:sp>
@@ -1577,7 +1583,7 @@
               <a:rPr lang="en-IN" smtClean="0"/>
               <a:t>‹#›</a:t>
             </a:fld>
-            <a:endParaRPr lang="en-IN"/>
+            <a:endParaRPr lang="en-IN" dirty="0"/>
           </a:p>
         </p:txBody>
       </p:sp>
@@ -1789,9 +1795,9 @@
           <a:p>
             <a:fld id="{95DF318F-AFED-48B5-A4C9-12E25A0AA439}" type="datetimeFigureOut">
               <a:rPr lang="en-IN" smtClean="0"/>
-              <a:t>30-06-2020</a:t>
+              <a:t>03-07-2020</a:t>
             </a:fld>
-            <a:endParaRPr lang="en-IN"/>
+            <a:endParaRPr lang="en-IN" dirty="0"/>
           </a:p>
         </p:txBody>
       </p:sp>
@@ -1816,7 +1822,7 @@
           <a:bodyPr/>
           <a:lstStyle/>
           <a:p>
-            <a:endParaRPr lang="en-IN"/>
+            <a:endParaRPr lang="en-IN" dirty="0"/>
           </a:p>
         </p:txBody>
       </p:sp>
@@ -1845,7 +1851,7 @@
               <a:rPr lang="en-IN" smtClean="0"/>
               <a:t>‹#›</a:t>
             </a:fld>
-            <a:endParaRPr lang="en-IN"/>
+            <a:endParaRPr lang="en-IN" dirty="0"/>
           </a:p>
         </p:txBody>
       </p:sp>
@@ -2204,9 +2210,9 @@
           <a:p>
             <a:fld id="{95DF318F-AFED-48B5-A4C9-12E25A0AA439}" type="datetimeFigureOut">
               <a:rPr lang="en-IN" smtClean="0"/>
-              <a:t>30-06-2020</a:t>
+              <a:t>03-07-2020</a:t>
             </a:fld>
-            <a:endParaRPr lang="en-IN"/>
+            <a:endParaRPr lang="en-IN" dirty="0"/>
           </a:p>
         </p:txBody>
       </p:sp>
@@ -2231,7 +2237,7 @@
           <a:bodyPr/>
           <a:lstStyle/>
           <a:p>
-            <a:endParaRPr lang="en-IN"/>
+            <a:endParaRPr lang="en-IN" dirty="0"/>
           </a:p>
         </p:txBody>
       </p:sp>
@@ -2260,7 +2266,7 @@
               <a:rPr lang="en-IN" smtClean="0"/>
               <a:t>‹#›</a:t>
             </a:fld>
-            <a:endParaRPr lang="en-IN"/>
+            <a:endParaRPr lang="en-IN" dirty="0"/>
           </a:p>
         </p:txBody>
       </p:sp>
@@ -2346,9 +2352,9 @@
           <a:p>
             <a:fld id="{95DF318F-AFED-48B5-A4C9-12E25A0AA439}" type="datetimeFigureOut">
               <a:rPr lang="en-IN" smtClean="0"/>
-              <a:t>30-06-2020</a:t>
+              <a:t>03-07-2020</a:t>
             </a:fld>
-            <a:endParaRPr lang="en-IN"/>
+            <a:endParaRPr lang="en-IN" dirty="0"/>
           </a:p>
         </p:txBody>
       </p:sp>
@@ -2373,7 +2379,7 @@
           <a:bodyPr/>
           <a:lstStyle/>
           <a:p>
-            <a:endParaRPr lang="en-IN"/>
+            <a:endParaRPr lang="en-IN" dirty="0"/>
           </a:p>
         </p:txBody>
       </p:sp>
@@ -2402,7 +2408,7 @@
               <a:rPr lang="en-IN" smtClean="0"/>
               <a:t>‹#›</a:t>
             </a:fld>
-            <a:endParaRPr lang="en-IN"/>
+            <a:endParaRPr lang="en-IN" dirty="0"/>
           </a:p>
         </p:txBody>
       </p:sp>
@@ -2459,9 +2465,9 @@
           <a:p>
             <a:fld id="{95DF318F-AFED-48B5-A4C9-12E25A0AA439}" type="datetimeFigureOut">
               <a:rPr lang="en-IN" smtClean="0"/>
-              <a:t>30-06-2020</a:t>
+              <a:t>03-07-2020</a:t>
             </a:fld>
-            <a:endParaRPr lang="en-IN"/>
+            <a:endParaRPr lang="en-IN" dirty="0"/>
           </a:p>
         </p:txBody>
       </p:sp>
@@ -2486,7 +2492,7 @@
           <a:bodyPr/>
           <a:lstStyle/>
           <a:p>
-            <a:endParaRPr lang="en-IN"/>
+            <a:endParaRPr lang="en-IN" dirty="0"/>
           </a:p>
         </p:txBody>
       </p:sp>
@@ -2515,7 +2521,7 @@
               <a:rPr lang="en-IN" smtClean="0"/>
               <a:t>‹#›</a:t>
             </a:fld>
-            <a:endParaRPr lang="en-IN"/>
+            <a:endParaRPr lang="en-IN" dirty="0"/>
           </a:p>
         </p:txBody>
       </p:sp>
@@ -2772,9 +2778,9 @@
           <a:p>
             <a:fld id="{95DF318F-AFED-48B5-A4C9-12E25A0AA439}" type="datetimeFigureOut">
               <a:rPr lang="en-IN" smtClean="0"/>
-              <a:t>30-06-2020</a:t>
+              <a:t>03-07-2020</a:t>
             </a:fld>
-            <a:endParaRPr lang="en-IN"/>
+            <a:endParaRPr lang="en-IN" dirty="0"/>
           </a:p>
         </p:txBody>
       </p:sp>
@@ -2799,7 +2805,7 @@
           <a:bodyPr/>
           <a:lstStyle/>
           <a:p>
-            <a:endParaRPr lang="en-IN"/>
+            <a:endParaRPr lang="en-IN" dirty="0"/>
           </a:p>
         </p:txBody>
       </p:sp>
@@ -2828,7 +2834,7 @@
               <a:rPr lang="en-IN" smtClean="0"/>
               <a:t>‹#›</a:t>
             </a:fld>
-            <a:endParaRPr lang="en-IN"/>
+            <a:endParaRPr lang="en-IN" dirty="0"/>
           </a:p>
         </p:txBody>
       </p:sp>
@@ -2963,7 +2969,7 @@
             </a:lvl9pPr>
           </a:lstStyle>
           <a:p>
-            <a:endParaRPr lang="en-IN"/>
+            <a:endParaRPr lang="en-IN" dirty="0"/>
           </a:p>
         </p:txBody>
       </p:sp>
@@ -3061,9 +3067,9 @@
           <a:p>
             <a:fld id="{95DF318F-AFED-48B5-A4C9-12E25A0AA439}" type="datetimeFigureOut">
               <a:rPr lang="en-IN" smtClean="0"/>
-              <a:t>30-06-2020</a:t>
+              <a:t>03-07-2020</a:t>
             </a:fld>
-            <a:endParaRPr lang="en-IN"/>
+            <a:endParaRPr lang="en-IN" dirty="0"/>
           </a:p>
         </p:txBody>
       </p:sp>
@@ -3088,7 +3094,7 @@
           <a:bodyPr/>
           <a:lstStyle/>
           <a:p>
-            <a:endParaRPr lang="en-IN"/>
+            <a:endParaRPr lang="en-IN" dirty="0"/>
           </a:p>
         </p:txBody>
       </p:sp>
@@ -3117,7 +3123,7 @@
               <a:rPr lang="en-IN" smtClean="0"/>
               <a:t>‹#›</a:t>
             </a:fld>
-            <a:endParaRPr lang="en-IN"/>
+            <a:endParaRPr lang="en-IN" dirty="0"/>
           </a:p>
         </p:txBody>
       </p:sp>
@@ -3304,9 +3310,9 @@
           <a:p>
             <a:fld id="{95DF318F-AFED-48B5-A4C9-12E25A0AA439}" type="datetimeFigureOut">
               <a:rPr lang="en-IN" smtClean="0"/>
-              <a:t>30-06-2020</a:t>
+              <a:t>03-07-2020</a:t>
             </a:fld>
-            <a:endParaRPr lang="en-IN"/>
+            <a:endParaRPr lang="en-IN" dirty="0"/>
           </a:p>
         </p:txBody>
       </p:sp>
@@ -3349,7 +3355,7 @@
             </a:lvl1pPr>
           </a:lstStyle>
           <a:p>
-            <a:endParaRPr lang="en-IN"/>
+            <a:endParaRPr lang="en-IN" dirty="0"/>
           </a:p>
         </p:txBody>
       </p:sp>
@@ -3396,7 +3402,7 @@
               <a:rPr lang="en-IN" smtClean="0"/>
               <a:t>‹#›</a:t>
             </a:fld>
-            <a:endParaRPr lang="en-IN"/>
+            <a:endParaRPr lang="en-IN" dirty="0"/>
           </a:p>
         </p:txBody>
       </p:sp>
@@ -3785,7 +3791,7 @@
           <a:lstStyle/>
           <a:p>
             <a:pPr algn="ctr"/>
-            <a:endParaRPr lang="en-US"/>
+            <a:endParaRPr lang="en-US" dirty="0"/>
           </a:p>
         </p:txBody>
       </p:sp>
@@ -4095,7 +4101,7 @@
           <a:lstStyle/>
           <a:p>
             <a:pPr algn="ctr"/>
-            <a:endParaRPr lang="en-US"/>
+            <a:endParaRPr lang="en-US" dirty="0"/>
           </a:p>
         </p:txBody>
       </p:sp>
@@ -4158,7 +4164,7 @@
           <a:lstStyle/>
           <a:p>
             <a:pPr algn="ctr"/>
-            <a:endParaRPr lang="en-US"/>
+            <a:endParaRPr lang="en-US" dirty="0"/>
           </a:p>
         </p:txBody>
       </p:sp>
@@ -4240,23 +4246,23 @@
         </p:nvSpPr>
         <p:spPr>
           <a:xfrm>
-            <a:off x="838200" y="75457"/>
-            <a:ext cx="10515600" cy="770654"/>
+            <a:off x="838200" y="192848"/>
+            <a:ext cx="10515600" cy="522769"/>
           </a:xfrm>
         </p:spPr>
         <p:txBody>
           <a:bodyPr>
-            <a:normAutofit/>
+            <a:normAutofit fontScale="90000"/>
           </a:bodyPr>
           <a:lstStyle/>
           <a:p>
             <a:r>
-              <a:rPr lang="en-IN" sz="4000" b="1" dirty="0">
+              <a:rPr lang="en-IN" sz="3200" b="1" dirty="0">
                 <a:solidFill>
                   <a:srgbClr val="002060"/>
                 </a:solidFill>
               </a:rPr>
-              <a:t>Operator-Controller-Module</a:t>
+              <a:t>Functional Model</a:t>
             </a:r>
           </a:p>
         </p:txBody>
@@ -4293,10 +4299,10 @@
       </p:pic>
       <p:pic>
         <p:nvPicPr>
-          <p:cNvPr id="5" name="Picture 4" descr="A screenshot of a cell phone&#10;&#10;Description automatically generated">
-            <a:extLst>
-              <a:ext uri="{FF2B5EF4-FFF2-40B4-BE49-F238E27FC236}">
-                <a16:creationId xmlns:a16="http://schemas.microsoft.com/office/drawing/2014/main" id="{AA9A6E3D-092C-4912-96E6-AEBFB74ACDE8}"/>
+          <p:cNvPr id="34" name="Picture 33" descr="A screenshot of a cell phone&#10;&#10;Description automatically generated">
+            <a:extLst>
+              <a:ext uri="{FF2B5EF4-FFF2-40B4-BE49-F238E27FC236}">
+                <a16:creationId xmlns:a16="http://schemas.microsoft.com/office/drawing/2014/main" id="{11941B89-3D69-4719-8FF6-5A126B5E8932}"/>
               </a:ext>
             </a:extLst>
           </p:cNvPr>
@@ -4319,8 +4325,8 @@
         </p:blipFill>
         <p:spPr>
           <a:xfrm>
-            <a:off x="3615397" y="1026926"/>
-            <a:ext cx="4750857" cy="5831074"/>
+            <a:off x="1985932" y="1047732"/>
+            <a:ext cx="9117992" cy="5282730"/>
           </a:xfrm>
           <a:prstGeom prst="rect">
             <a:avLst/>
@@ -4330,7 +4336,7 @@
     </p:spTree>
     <p:extLst>
       <p:ext uri="{BB962C8B-B14F-4D97-AF65-F5344CB8AC3E}">
-        <p14:creationId xmlns:p14="http://schemas.microsoft.com/office/powerpoint/2010/main" val="1649143781"/>
+        <p14:creationId xmlns:p14="http://schemas.microsoft.com/office/powerpoint/2010/main" val="522260827"/>
       </p:ext>
     </p:extLst>
   </p:cSld>
@@ -4375,23 +4381,23 @@
         </p:nvSpPr>
         <p:spPr>
           <a:xfrm>
-            <a:off x="838200" y="201530"/>
-            <a:ext cx="10515600" cy="770654"/>
+            <a:off x="838200" y="192848"/>
+            <a:ext cx="10515600" cy="522769"/>
           </a:xfrm>
         </p:spPr>
         <p:txBody>
           <a:bodyPr>
-            <a:normAutofit/>
+            <a:normAutofit fontScale="90000"/>
           </a:bodyPr>
           <a:lstStyle/>
           <a:p>
             <a:r>
-              <a:rPr lang="en-IN" sz="4000" b="1" dirty="0">
+              <a:rPr lang="en-IN" sz="3200" b="1" dirty="0">
                 <a:solidFill>
                   <a:srgbClr val="002060"/>
                 </a:solidFill>
               </a:rPr>
-              <a:t>Macro Architecture</a:t>
+              <a:t>Functional Model</a:t>
             </a:r>
           </a:p>
         </p:txBody>
@@ -4431,7 +4437,7 @@
           <p:cNvPr id="5" name="Picture 4" descr="A screenshot of a cell phone&#10;&#10;Description automatically generated">
             <a:extLst>
               <a:ext uri="{FF2B5EF4-FFF2-40B4-BE49-F238E27FC236}">
-                <a16:creationId xmlns:a16="http://schemas.microsoft.com/office/drawing/2014/main" id="{DA80783B-A961-4421-AAA0-C3C5CD3A6AD0}"/>
+                <a16:creationId xmlns:a16="http://schemas.microsoft.com/office/drawing/2014/main" id="{0DC5FDB9-0B5C-4EED-9E2D-666E9539492F}"/>
               </a:ext>
             </a:extLst>
           </p:cNvPr>
@@ -4454,8 +4460,44 @@
         </p:blipFill>
         <p:spPr>
           <a:xfrm>
-            <a:off x="738146" y="1047641"/>
-            <a:ext cx="9814560" cy="5520690"/>
+            <a:off x="0" y="1218563"/>
+            <a:ext cx="6465406" cy="4420874"/>
+          </a:xfrm>
+          <a:prstGeom prst="rect">
+            <a:avLst/>
+          </a:prstGeom>
+        </p:spPr>
+      </p:pic>
+      <p:pic>
+        <p:nvPicPr>
+          <p:cNvPr id="9" name="Picture 8" descr="A picture containing screenshot&#10;&#10;Description automatically generated">
+            <a:extLst>
+              <a:ext uri="{FF2B5EF4-FFF2-40B4-BE49-F238E27FC236}">
+                <a16:creationId xmlns:a16="http://schemas.microsoft.com/office/drawing/2014/main" id="{9D027899-FF77-45F5-8123-829408DF2A3D}"/>
+              </a:ext>
+            </a:extLst>
+          </p:cNvPr>
+          <p:cNvPicPr>
+            <a:picLocks noChangeAspect="1"/>
+          </p:cNvPicPr>
+          <p:nvPr/>
+        </p:nvPicPr>
+        <p:blipFill>
+          <a:blip r:embed="rId4">
+            <a:extLst>
+              <a:ext uri="{28A0092B-C50C-407E-A947-70E740481C1C}">
+                <a14:useLocalDpi xmlns:a14="http://schemas.microsoft.com/office/drawing/2010/main" val="0"/>
+              </a:ext>
+            </a:extLst>
+          </a:blip>
+          <a:stretch>
+            <a:fillRect/>
+          </a:stretch>
+        </p:blipFill>
+        <p:spPr>
+          <a:xfrm>
+            <a:off x="6571466" y="1218563"/>
+            <a:ext cx="5620534" cy="4277322"/>
           </a:xfrm>
           <a:prstGeom prst="rect">
             <a:avLst/>
@@ -4465,7 +4507,7 @@
     </p:spTree>
     <p:extLst>
       <p:ext uri="{BB962C8B-B14F-4D97-AF65-F5344CB8AC3E}">
-        <p14:creationId xmlns:p14="http://schemas.microsoft.com/office/powerpoint/2010/main" val="3615582200"/>
+        <p14:creationId xmlns:p14="http://schemas.microsoft.com/office/powerpoint/2010/main" val="784845702"/>
       </p:ext>
     </p:extLst>
   </p:cSld>
@@ -4492,51 +4534,12 @@
           <a:chExt cx="0" cy="0"/>
         </a:xfrm>
       </p:grpSpPr>
-      <p:sp>
-        <p:nvSpPr>
-          <p:cNvPr id="2" name="Title 1">
-            <a:extLst>
-              <a:ext uri="{FF2B5EF4-FFF2-40B4-BE49-F238E27FC236}">
-                <a16:creationId xmlns:a16="http://schemas.microsoft.com/office/drawing/2014/main" id="{3046C11F-7160-4D6E-B2F8-4AD6752B1B56}"/>
-              </a:ext>
-            </a:extLst>
-          </p:cNvPr>
-          <p:cNvSpPr>
-            <a:spLocks noGrp="1"/>
-          </p:cNvSpPr>
-          <p:nvPr>
-            <p:ph type="title"/>
-          </p:nvPr>
-        </p:nvSpPr>
-        <p:spPr>
-          <a:xfrm>
-            <a:off x="838200" y="180204"/>
-            <a:ext cx="10515600" cy="770654"/>
-          </a:xfrm>
-        </p:spPr>
-        <p:txBody>
-          <a:bodyPr>
-            <a:normAutofit/>
-          </a:bodyPr>
-          <a:lstStyle/>
-          <a:p>
-            <a:r>
-              <a:rPr lang="en-IN" sz="4000" b="1" dirty="0">
-                <a:solidFill>
-                  <a:srgbClr val="002060"/>
-                </a:solidFill>
-              </a:rPr>
-              <a:t>Detect Role</a:t>
-            </a:r>
-          </a:p>
-        </p:txBody>
-      </p:sp>
       <p:pic>
         <p:nvPicPr>
-          <p:cNvPr id="4" name="Picture 3" descr="A picture containing knife&#10;&#10;Description automatically generated">
-            <a:extLst>
-              <a:ext uri="{FF2B5EF4-FFF2-40B4-BE49-F238E27FC236}">
-                <a16:creationId xmlns:a16="http://schemas.microsoft.com/office/drawing/2014/main" id="{4D1A53CC-4C76-4EB3-9971-A83B9C9BA87B}"/>
+          <p:cNvPr id="7" name="Picture 6" descr="A screenshot of a cell phone&#10;&#10;Description automatically generated">
+            <a:extLst>
+              <a:ext uri="{FF2B5EF4-FFF2-40B4-BE49-F238E27FC236}">
+                <a16:creationId xmlns:a16="http://schemas.microsoft.com/office/drawing/2014/main" id="{63B06B40-634F-4EEB-85BB-8746689E5B68}"/>
               </a:ext>
             </a:extLst>
           </p:cNvPr>
@@ -4546,27 +4549,72 @@
           <p:nvPr/>
         </p:nvPicPr>
         <p:blipFill>
-          <a:blip r:embed="rId2"/>
+          <a:blip r:embed="rId2">
+            <a:extLst>
+              <a:ext uri="{28A0092B-C50C-407E-A947-70E740481C1C}">
+                <a14:useLocalDpi xmlns:a14="http://schemas.microsoft.com/office/drawing/2010/main" val="0"/>
+              </a:ext>
+            </a:extLst>
+          </a:blip>
           <a:stretch>
             <a:fillRect/>
           </a:stretch>
         </p:blipFill>
         <p:spPr>
           <a:xfrm>
-            <a:off x="10255348" y="0"/>
-            <a:ext cx="1936652" cy="846111"/>
+            <a:off x="185530" y="622852"/>
+            <a:ext cx="11767931" cy="6235148"/>
           </a:xfrm>
           <a:prstGeom prst="rect">
             <a:avLst/>
           </a:prstGeom>
         </p:spPr>
       </p:pic>
+      <p:sp>
+        <p:nvSpPr>
+          <p:cNvPr id="2" name="Title 1">
+            <a:extLst>
+              <a:ext uri="{FF2B5EF4-FFF2-40B4-BE49-F238E27FC236}">
+                <a16:creationId xmlns:a16="http://schemas.microsoft.com/office/drawing/2014/main" id="{3046C11F-7160-4D6E-B2F8-4AD6752B1B56}"/>
+              </a:ext>
+            </a:extLst>
+          </p:cNvPr>
+          <p:cNvSpPr>
+            <a:spLocks noGrp="1"/>
+          </p:cNvSpPr>
+          <p:nvPr>
+            <p:ph type="title"/>
+          </p:nvPr>
+        </p:nvSpPr>
+        <p:spPr>
+          <a:xfrm>
+            <a:off x="838200" y="219352"/>
+            <a:ext cx="10515600" cy="403500"/>
+          </a:xfrm>
+        </p:spPr>
+        <p:txBody>
+          <a:bodyPr>
+            <a:normAutofit fontScale="90000"/>
+          </a:bodyPr>
+          <a:lstStyle/>
+          <a:p>
+            <a:r>
+              <a:rPr lang="en-IN" sz="3200" b="1" dirty="0">
+                <a:solidFill>
+                  <a:srgbClr val="002060"/>
+                </a:solidFill>
+              </a:rPr>
+              <a:t>Active Structure</a:t>
+            </a:r>
+          </a:p>
+        </p:txBody>
+      </p:sp>
       <p:pic>
         <p:nvPicPr>
-          <p:cNvPr id="7" name="Picture 6" descr="A picture containing screenshot&#10;&#10;Description automatically generated">
-            <a:extLst>
-              <a:ext uri="{FF2B5EF4-FFF2-40B4-BE49-F238E27FC236}">
-                <a16:creationId xmlns:a16="http://schemas.microsoft.com/office/drawing/2014/main" id="{5662E027-F8CA-4174-8CA0-C5B4105D408B}"/>
+          <p:cNvPr id="4" name="Picture 3" descr="A picture containing knife&#10;&#10;Description automatically generated">
+            <a:extLst>
+              <a:ext uri="{FF2B5EF4-FFF2-40B4-BE49-F238E27FC236}">
+                <a16:creationId xmlns:a16="http://schemas.microsoft.com/office/drawing/2014/main" id="{4D1A53CC-4C76-4EB3-9971-A83B9C9BA87B}"/>
               </a:ext>
             </a:extLst>
           </p:cNvPr>
@@ -4576,21 +4624,15 @@
           <p:nvPr/>
         </p:nvPicPr>
         <p:blipFill>
-          <a:blip r:embed="rId3">
-            <a:extLst>
-              <a:ext uri="{28A0092B-C50C-407E-A947-70E740481C1C}">
-                <a14:useLocalDpi xmlns:a14="http://schemas.microsoft.com/office/drawing/2010/main" val="0"/>
-              </a:ext>
-            </a:extLst>
-          </a:blip>
+          <a:blip r:embed="rId3"/>
           <a:stretch>
             <a:fillRect/>
           </a:stretch>
         </p:blipFill>
         <p:spPr>
           <a:xfrm>
-            <a:off x="1926564" y="950858"/>
-            <a:ext cx="8338872" cy="5907142"/>
+            <a:off x="10255348" y="0"/>
+            <a:ext cx="1936652" cy="846111"/>
           </a:xfrm>
           <a:prstGeom prst="rect">
             <a:avLst/>
@@ -4600,7 +4642,7 @@
     </p:spTree>
     <p:extLst>
       <p:ext uri="{BB962C8B-B14F-4D97-AF65-F5344CB8AC3E}">
-        <p14:creationId xmlns:p14="http://schemas.microsoft.com/office/powerpoint/2010/main" val="933190703"/>
+        <p14:creationId xmlns:p14="http://schemas.microsoft.com/office/powerpoint/2010/main" val="2572804484"/>
       </p:ext>
     </p:extLst>
   </p:cSld>
@@ -4645,7 +4687,7 @@
         </p:nvSpPr>
         <p:spPr>
           <a:xfrm>
-            <a:off x="838200" y="180204"/>
+            <a:off x="838200" y="201530"/>
             <a:ext cx="10515600" cy="770654"/>
           </a:xfrm>
         </p:spPr>
@@ -4656,12 +4698,12 @@
           <a:lstStyle/>
           <a:p>
             <a:r>
-              <a:rPr lang="en-IN" sz="4000" b="1" dirty="0">
+              <a:rPr lang="en-IN" sz="3200" b="1" dirty="0">
                 <a:solidFill>
                   <a:srgbClr val="002060"/>
                 </a:solidFill>
               </a:rPr>
-              <a:t>Detect Role</a:t>
+              <a:t>Macro Architecture</a:t>
             </a:r>
           </a:p>
         </p:txBody>
@@ -4698,10 +4740,10 @@
       </p:pic>
       <p:pic>
         <p:nvPicPr>
-          <p:cNvPr id="5" name="Picture 4" descr="A screenshot of a social media post&#10;&#10;Description automatically generated">
-            <a:extLst>
-              <a:ext uri="{FF2B5EF4-FFF2-40B4-BE49-F238E27FC236}">
-                <a16:creationId xmlns:a16="http://schemas.microsoft.com/office/drawing/2014/main" id="{017AE137-819E-42DC-8FE6-9EA1F2355C65}"/>
+          <p:cNvPr id="8" name="Picture 7" descr="A screenshot of a cell phone&#10;&#10;Description automatically generated">
+            <a:extLst>
+              <a:ext uri="{FF2B5EF4-FFF2-40B4-BE49-F238E27FC236}">
+                <a16:creationId xmlns:a16="http://schemas.microsoft.com/office/drawing/2014/main" id="{342EFADE-63F3-4F7A-908E-99A905C67016}"/>
               </a:ext>
             </a:extLst>
           </p:cNvPr>
@@ -4724,8 +4766,8 @@
         </p:blipFill>
         <p:spPr>
           <a:xfrm>
-            <a:off x="6033717" y="1654706"/>
-            <a:ext cx="6158283" cy="3548588"/>
+            <a:off x="838200" y="846111"/>
+            <a:ext cx="10208410" cy="5742230"/>
           </a:xfrm>
           <a:prstGeom prst="rect">
             <a:avLst/>
@@ -4735,7 +4777,7 @@
     </p:spTree>
     <p:extLst>
       <p:ext uri="{BB962C8B-B14F-4D97-AF65-F5344CB8AC3E}">
-        <p14:creationId xmlns:p14="http://schemas.microsoft.com/office/powerpoint/2010/main" val="3770120600"/>
+        <p14:creationId xmlns:p14="http://schemas.microsoft.com/office/powerpoint/2010/main" val="3615582200"/>
       </p:ext>
     </p:extLst>
   </p:cSld>
@@ -4780,8 +4822,8 @@
         </p:nvSpPr>
         <p:spPr>
           <a:xfrm>
-            <a:off x="838200" y="180204"/>
-            <a:ext cx="10515600" cy="770654"/>
+            <a:off x="838200" y="75457"/>
+            <a:ext cx="10515600" cy="560647"/>
           </a:xfrm>
         </p:spPr>
         <p:txBody>
@@ -4791,12 +4833,12 @@
           <a:lstStyle/>
           <a:p>
             <a:r>
-              <a:rPr lang="en-IN" sz="4000" b="1" dirty="0">
+              <a:rPr lang="en-IN" sz="3200" b="1" dirty="0">
                 <a:solidFill>
                   <a:srgbClr val="002060"/>
                 </a:solidFill>
               </a:rPr>
-              <a:t>Survey Role</a:t>
+              <a:t>Operator-Controller-Module</a:t>
             </a:r>
           </a:p>
         </p:txBody>
@@ -4833,10 +4875,10 @@
       </p:pic>
       <p:pic>
         <p:nvPicPr>
-          <p:cNvPr id="6" name="Picture 5" descr="A picture containing screenshot&#10;&#10;Description automatically generated">
-            <a:extLst>
-              <a:ext uri="{FF2B5EF4-FFF2-40B4-BE49-F238E27FC236}">
-                <a16:creationId xmlns:a16="http://schemas.microsoft.com/office/drawing/2014/main" id="{8378211C-F641-4EB6-B362-D91CA6C243F4}"/>
+          <p:cNvPr id="5" name="Picture 4" descr="A screenshot of a cell phone&#10;&#10;Description automatically generated">
+            <a:extLst>
+              <a:ext uri="{FF2B5EF4-FFF2-40B4-BE49-F238E27FC236}">
+                <a16:creationId xmlns:a16="http://schemas.microsoft.com/office/drawing/2014/main" id="{AA9A6E3D-092C-4912-96E6-AEBFB74ACDE8}"/>
               </a:ext>
             </a:extLst>
           </p:cNvPr>
@@ -4859,8 +4901,8 @@
         </p:blipFill>
         <p:spPr>
           <a:xfrm>
-            <a:off x="1630354" y="846111"/>
-            <a:ext cx="8931292" cy="5907142"/>
+            <a:off x="3436873" y="619539"/>
+            <a:ext cx="5318254" cy="6146439"/>
           </a:xfrm>
           <a:prstGeom prst="rect">
             <a:avLst/>
@@ -4870,7 +4912,7 @@
     </p:spTree>
     <p:extLst>
       <p:ext uri="{BB962C8B-B14F-4D97-AF65-F5344CB8AC3E}">
-        <p14:creationId xmlns:p14="http://schemas.microsoft.com/office/powerpoint/2010/main" val="4282175950"/>
+        <p14:creationId xmlns:p14="http://schemas.microsoft.com/office/powerpoint/2010/main" val="1649143781"/>
       </p:ext>
     </p:extLst>
   </p:cSld>
@@ -4915,8 +4957,8 @@
         </p:nvSpPr>
         <p:spPr>
           <a:xfrm>
-            <a:off x="838200" y="180204"/>
-            <a:ext cx="10515600" cy="770654"/>
+            <a:off x="838200" y="75457"/>
+            <a:ext cx="10515600" cy="560647"/>
           </a:xfrm>
         </p:spPr>
         <p:txBody>
@@ -4926,12 +4968,12 @@
           <a:lstStyle/>
           <a:p>
             <a:r>
-              <a:rPr lang="en-IN" sz="4000" b="1" dirty="0">
+              <a:rPr lang="en-IN" sz="3200" b="1" dirty="0">
                 <a:solidFill>
                   <a:srgbClr val="002060"/>
                 </a:solidFill>
               </a:rPr>
-              <a:t>Survey Role</a:t>
+              <a:t>Rescue System</a:t>
             </a:r>
           </a:p>
         </p:txBody>
@@ -4968,10 +5010,10 @@
       </p:pic>
       <p:pic>
         <p:nvPicPr>
-          <p:cNvPr id="5" name="Picture 4" descr="A close up of a map&#10;&#10;Description automatically generated">
-            <a:extLst>
-              <a:ext uri="{FF2B5EF4-FFF2-40B4-BE49-F238E27FC236}">
-                <a16:creationId xmlns:a16="http://schemas.microsoft.com/office/drawing/2014/main" id="{F23B6DD5-A966-49FF-948E-C0FB568A65DE}"/>
+          <p:cNvPr id="6" name="Picture 5" descr="A picture containing clock, propeller&#10;&#10;Description automatically generated">
+            <a:extLst>
+              <a:ext uri="{FF2B5EF4-FFF2-40B4-BE49-F238E27FC236}">
+                <a16:creationId xmlns:a16="http://schemas.microsoft.com/office/drawing/2014/main" id="{054D4816-7323-4AFD-9615-3A9FC066556E}"/>
               </a:ext>
             </a:extLst>
           </p:cNvPr>
@@ -4994,18 +5036,1068 @@
         </p:blipFill>
         <p:spPr>
           <a:xfrm>
-            <a:off x="6733413" y="1752366"/>
-            <a:ext cx="5458587" cy="3353268"/>
+            <a:off x="1112520" y="3428999"/>
+            <a:ext cx="1692222" cy="846111"/>
           </a:xfrm>
           <a:prstGeom prst="rect">
             <a:avLst/>
           </a:prstGeom>
         </p:spPr>
       </p:pic>
+      <p:pic>
+        <p:nvPicPr>
+          <p:cNvPr id="8" name="Picture 7" descr="A picture containing clock, propeller&#10;&#10;Description automatically generated">
+            <a:extLst>
+              <a:ext uri="{FF2B5EF4-FFF2-40B4-BE49-F238E27FC236}">
+                <a16:creationId xmlns:a16="http://schemas.microsoft.com/office/drawing/2014/main" id="{E7BCEDBF-D98B-4DCC-9886-04CE055FEF2F}"/>
+              </a:ext>
+            </a:extLst>
+          </p:cNvPr>
+          <p:cNvPicPr>
+            <a:picLocks noChangeAspect="1"/>
+          </p:cNvPicPr>
+          <p:nvPr/>
+        </p:nvPicPr>
+        <p:blipFill>
+          <a:blip r:embed="rId3">
+            <a:extLst>
+              <a:ext uri="{28A0092B-C50C-407E-A947-70E740481C1C}">
+                <a14:useLocalDpi xmlns:a14="http://schemas.microsoft.com/office/drawing/2010/main" val="0"/>
+              </a:ext>
+            </a:extLst>
+          </a:blip>
+          <a:stretch>
+            <a:fillRect/>
+          </a:stretch>
+        </p:blipFill>
+        <p:spPr>
+          <a:xfrm>
+            <a:off x="4932485" y="1098741"/>
+            <a:ext cx="1936652" cy="968326"/>
+          </a:xfrm>
+          <a:prstGeom prst="rect">
+            <a:avLst/>
+          </a:prstGeom>
+        </p:spPr>
+      </p:pic>
+      <p:pic>
+        <p:nvPicPr>
+          <p:cNvPr id="9" name="Picture 8" descr="A picture containing clock, propeller&#10;&#10;Description automatically generated">
+            <a:extLst>
+              <a:ext uri="{FF2B5EF4-FFF2-40B4-BE49-F238E27FC236}">
+                <a16:creationId xmlns:a16="http://schemas.microsoft.com/office/drawing/2014/main" id="{0994ADAC-DCF5-4DAC-8BA6-BEF678CE34E3}"/>
+              </a:ext>
+            </a:extLst>
+          </p:cNvPr>
+          <p:cNvPicPr>
+            <a:picLocks noChangeAspect="1"/>
+          </p:cNvPicPr>
+          <p:nvPr/>
+        </p:nvPicPr>
+        <p:blipFill>
+          <a:blip r:embed="rId3">
+            <a:extLst>
+              <a:ext uri="{28A0092B-C50C-407E-A947-70E740481C1C}">
+                <a14:useLocalDpi xmlns:a14="http://schemas.microsoft.com/office/drawing/2010/main" val="0"/>
+              </a:ext>
+            </a:extLst>
+          </a:blip>
+          <a:stretch>
+            <a:fillRect/>
+          </a:stretch>
+        </p:blipFill>
+        <p:spPr>
+          <a:xfrm>
+            <a:off x="9114692" y="3428999"/>
+            <a:ext cx="1692222" cy="846111"/>
+          </a:xfrm>
+          <a:prstGeom prst="rect">
+            <a:avLst/>
+          </a:prstGeom>
+        </p:spPr>
+      </p:pic>
+      <p:cxnSp>
+        <p:nvCxnSpPr>
+          <p:cNvPr id="19" name="Connector: Elbow 18">
+            <a:extLst>
+              <a:ext uri="{FF2B5EF4-FFF2-40B4-BE49-F238E27FC236}">
+                <a16:creationId xmlns:a16="http://schemas.microsoft.com/office/drawing/2014/main" id="{0D1AC2B7-74A2-4249-A68E-764F40D01F6B}"/>
+              </a:ext>
+            </a:extLst>
+          </p:cNvPr>
+          <p:cNvCxnSpPr>
+            <a:stCxn id="8" idx="3"/>
+            <a:endCxn id="9" idx="1"/>
+          </p:cNvCxnSpPr>
+          <p:nvPr/>
+        </p:nvCxnSpPr>
+        <p:spPr>
+          <a:xfrm>
+            <a:off x="6869137" y="1582904"/>
+            <a:ext cx="2245555" cy="2269151"/>
+          </a:xfrm>
+          <a:prstGeom prst="bentConnector3">
+            <a:avLst>
+              <a:gd name="adj1" fmla="val 74786"/>
+            </a:avLst>
+          </a:prstGeom>
+          <a:ln>
+            <a:solidFill>
+              <a:schemeClr val="tx1"/>
+            </a:solidFill>
+            <a:headEnd type="triangle"/>
+            <a:tailEnd type="triangle"/>
+          </a:ln>
+        </p:spPr>
+        <p:style>
+          <a:lnRef idx="1">
+            <a:schemeClr val="accent1"/>
+          </a:lnRef>
+          <a:fillRef idx="0">
+            <a:schemeClr val="accent1"/>
+          </a:fillRef>
+          <a:effectRef idx="0">
+            <a:schemeClr val="accent1"/>
+          </a:effectRef>
+          <a:fontRef idx="minor">
+            <a:schemeClr val="tx1"/>
+          </a:fontRef>
+        </p:style>
+      </p:cxnSp>
+      <p:cxnSp>
+        <p:nvCxnSpPr>
+          <p:cNvPr id="21" name="Connector: Elbow 20">
+            <a:extLst>
+              <a:ext uri="{FF2B5EF4-FFF2-40B4-BE49-F238E27FC236}">
+                <a16:creationId xmlns:a16="http://schemas.microsoft.com/office/drawing/2014/main" id="{506723FE-1FAE-40F9-91C6-B6874E1FF53D}"/>
+              </a:ext>
+            </a:extLst>
+          </p:cNvPr>
+          <p:cNvCxnSpPr>
+            <a:stCxn id="8" idx="1"/>
+            <a:endCxn id="6" idx="3"/>
+          </p:cNvCxnSpPr>
+          <p:nvPr/>
+        </p:nvCxnSpPr>
+        <p:spPr>
+          <a:xfrm rot="10800000" flipV="1">
+            <a:off x="2804743" y="1582903"/>
+            <a:ext cx="2127743" cy="2269151"/>
+          </a:xfrm>
+          <a:prstGeom prst="bentConnector3">
+            <a:avLst>
+              <a:gd name="adj1" fmla="val 69930"/>
+            </a:avLst>
+          </a:prstGeom>
+          <a:ln>
+            <a:solidFill>
+              <a:schemeClr val="tx1"/>
+            </a:solidFill>
+            <a:headEnd type="triangle"/>
+            <a:tailEnd type="triangle"/>
+          </a:ln>
+        </p:spPr>
+        <p:style>
+          <a:lnRef idx="1">
+            <a:schemeClr val="accent1"/>
+          </a:lnRef>
+          <a:fillRef idx="0">
+            <a:schemeClr val="accent1"/>
+          </a:fillRef>
+          <a:effectRef idx="0">
+            <a:schemeClr val="accent1"/>
+          </a:effectRef>
+          <a:fontRef idx="minor">
+            <a:schemeClr val="tx1"/>
+          </a:fontRef>
+        </p:style>
+      </p:cxnSp>
+      <p:pic>
+        <p:nvPicPr>
+          <p:cNvPr id="23" name="Graphic 22" descr="Medical">
+            <a:extLst>
+              <a:ext uri="{FF2B5EF4-FFF2-40B4-BE49-F238E27FC236}">
+                <a16:creationId xmlns:a16="http://schemas.microsoft.com/office/drawing/2014/main" id="{EDEC8CF2-772F-4D21-B299-E649E887F621}"/>
+              </a:ext>
+            </a:extLst>
+          </p:cNvPr>
+          <p:cNvPicPr>
+            <a:picLocks noChangeAspect="1"/>
+          </p:cNvPicPr>
+          <p:nvPr/>
+        </p:nvPicPr>
+        <p:blipFill>
+          <a:blip r:embed="rId4">
+            <a:extLst>
+              <a:ext uri="{28A0092B-C50C-407E-A947-70E740481C1C}">
+                <a14:useLocalDpi xmlns:a14="http://schemas.microsoft.com/office/drawing/2010/main" val="0"/>
+              </a:ext>
+              <a:ext uri="{96DAC541-7B7A-43D3-8B79-37D633B846F1}">
+                <asvg:svgBlip xmlns:asvg="http://schemas.microsoft.com/office/drawing/2016/SVG/main" r:embed="rId5"/>
+              </a:ext>
+            </a:extLst>
+          </a:blip>
+          <a:stretch>
+            <a:fillRect/>
+          </a:stretch>
+        </p:blipFill>
+        <p:spPr>
+          <a:xfrm>
+            <a:off x="5572539" y="5206804"/>
+            <a:ext cx="914400" cy="914400"/>
+          </a:xfrm>
+          <a:prstGeom prst="rect">
+            <a:avLst/>
+          </a:prstGeom>
+        </p:spPr>
+      </p:pic>
+      <p:cxnSp>
+        <p:nvCxnSpPr>
+          <p:cNvPr id="27" name="Connector: Elbow 26">
+            <a:extLst>
+              <a:ext uri="{FF2B5EF4-FFF2-40B4-BE49-F238E27FC236}">
+                <a16:creationId xmlns:a16="http://schemas.microsoft.com/office/drawing/2014/main" id="{E01346E6-65E2-40FA-9570-3F37E980409A}"/>
+              </a:ext>
+            </a:extLst>
+          </p:cNvPr>
+          <p:cNvCxnSpPr>
+            <a:cxnSpLocks/>
+            <a:stCxn id="6" idx="2"/>
+            <a:endCxn id="23" idx="1"/>
+          </p:cNvCxnSpPr>
+          <p:nvPr/>
+        </p:nvCxnSpPr>
+        <p:spPr>
+          <a:xfrm rot="16200000" flipH="1">
+            <a:off x="3071138" y="3162603"/>
+            <a:ext cx="1388894" cy="3613908"/>
+          </a:xfrm>
+          <a:prstGeom prst="bentConnector2">
+            <a:avLst/>
+          </a:prstGeom>
+          <a:ln>
+            <a:solidFill>
+              <a:srgbClr val="00B050"/>
+            </a:solidFill>
+            <a:tailEnd type="triangle"/>
+          </a:ln>
+        </p:spPr>
+        <p:style>
+          <a:lnRef idx="1">
+            <a:schemeClr val="accent1"/>
+          </a:lnRef>
+          <a:fillRef idx="0">
+            <a:schemeClr val="accent1"/>
+          </a:fillRef>
+          <a:effectRef idx="0">
+            <a:schemeClr val="accent1"/>
+          </a:effectRef>
+          <a:fontRef idx="minor">
+            <a:schemeClr val="tx1"/>
+          </a:fontRef>
+        </p:style>
+      </p:cxnSp>
+      <p:cxnSp>
+        <p:nvCxnSpPr>
+          <p:cNvPr id="30" name="Connector: Elbow 29">
+            <a:extLst>
+              <a:ext uri="{FF2B5EF4-FFF2-40B4-BE49-F238E27FC236}">
+                <a16:creationId xmlns:a16="http://schemas.microsoft.com/office/drawing/2014/main" id="{079D7A16-CB8D-4EE8-BB35-CA1DC2C2A0D9}"/>
+              </a:ext>
+            </a:extLst>
+          </p:cNvPr>
+          <p:cNvCxnSpPr>
+            <a:stCxn id="9" idx="2"/>
+            <a:endCxn id="23" idx="3"/>
+          </p:cNvCxnSpPr>
+          <p:nvPr/>
+        </p:nvCxnSpPr>
+        <p:spPr>
+          <a:xfrm rot="5400000">
+            <a:off x="7529424" y="3232625"/>
+            <a:ext cx="1388894" cy="3473864"/>
+          </a:xfrm>
+          <a:prstGeom prst="bentConnector2">
+            <a:avLst/>
+          </a:prstGeom>
+          <a:ln>
+            <a:solidFill>
+              <a:srgbClr val="00B050"/>
+            </a:solidFill>
+            <a:tailEnd type="triangle"/>
+          </a:ln>
+        </p:spPr>
+        <p:style>
+          <a:lnRef idx="1">
+            <a:schemeClr val="accent1"/>
+          </a:lnRef>
+          <a:fillRef idx="0">
+            <a:schemeClr val="accent1"/>
+          </a:fillRef>
+          <a:effectRef idx="0">
+            <a:schemeClr val="accent1"/>
+          </a:effectRef>
+          <a:fontRef idx="minor">
+            <a:schemeClr val="tx1"/>
+          </a:fontRef>
+        </p:style>
+      </p:cxnSp>
+      <p:pic>
+        <p:nvPicPr>
+          <p:cNvPr id="32" name="Graphic 31" descr="Home">
+            <a:extLst>
+              <a:ext uri="{FF2B5EF4-FFF2-40B4-BE49-F238E27FC236}">
+                <a16:creationId xmlns:a16="http://schemas.microsoft.com/office/drawing/2014/main" id="{DF745824-30C0-4D2A-9BD6-000D35B93A80}"/>
+              </a:ext>
+            </a:extLst>
+          </p:cNvPr>
+          <p:cNvPicPr>
+            <a:picLocks noChangeAspect="1"/>
+          </p:cNvPicPr>
+          <p:nvPr/>
+        </p:nvPicPr>
+        <p:blipFill>
+          <a:blip r:embed="rId6">
+            <a:extLst>
+              <a:ext uri="{28A0092B-C50C-407E-A947-70E740481C1C}">
+                <a14:useLocalDpi xmlns:a14="http://schemas.microsoft.com/office/drawing/2010/main" val="0"/>
+              </a:ext>
+              <a:ext uri="{96DAC541-7B7A-43D3-8B79-37D633B846F1}">
+                <asvg:svgBlip xmlns:asvg="http://schemas.microsoft.com/office/drawing/2016/SVG/main" r:embed="rId7"/>
+              </a:ext>
+            </a:extLst>
+          </a:blip>
+          <a:stretch>
+            <a:fillRect/>
+          </a:stretch>
+        </p:blipFill>
+        <p:spPr>
+          <a:xfrm>
+            <a:off x="6096000" y="2937654"/>
+            <a:ext cx="914400" cy="914400"/>
+          </a:xfrm>
+          <a:prstGeom prst="rect">
+            <a:avLst/>
+          </a:prstGeom>
+        </p:spPr>
+      </p:pic>
+      <p:pic>
+        <p:nvPicPr>
+          <p:cNvPr id="34" name="Graphic 33" descr="Building">
+            <a:extLst>
+              <a:ext uri="{FF2B5EF4-FFF2-40B4-BE49-F238E27FC236}">
+                <a16:creationId xmlns:a16="http://schemas.microsoft.com/office/drawing/2014/main" id="{459196DA-A7B1-4193-9C46-2C91BC8A0202}"/>
+              </a:ext>
+            </a:extLst>
+          </p:cNvPr>
+          <p:cNvPicPr>
+            <a:picLocks noChangeAspect="1"/>
+          </p:cNvPicPr>
+          <p:nvPr/>
+        </p:nvPicPr>
+        <p:blipFill>
+          <a:blip r:embed="rId8">
+            <a:extLst>
+              <a:ext uri="{28A0092B-C50C-407E-A947-70E740481C1C}">
+                <a14:useLocalDpi xmlns:a14="http://schemas.microsoft.com/office/drawing/2010/main" val="0"/>
+              </a:ext>
+              <a:ext uri="{96DAC541-7B7A-43D3-8B79-37D633B846F1}">
+                <asvg:svgBlip xmlns:asvg="http://schemas.microsoft.com/office/drawing/2016/SVG/main" r:embed="rId9"/>
+              </a:ext>
+            </a:extLst>
+          </a:blip>
+          <a:stretch>
+            <a:fillRect/>
+          </a:stretch>
+        </p:blipFill>
+        <p:spPr>
+          <a:xfrm>
+            <a:off x="5339743" y="3786705"/>
+            <a:ext cx="914400" cy="914400"/>
+          </a:xfrm>
+          <a:prstGeom prst="rect">
+            <a:avLst/>
+          </a:prstGeom>
+        </p:spPr>
+      </p:pic>
+      <p:pic>
+        <p:nvPicPr>
+          <p:cNvPr id="36" name="Graphic 35" descr="House">
+            <a:extLst>
+              <a:ext uri="{FF2B5EF4-FFF2-40B4-BE49-F238E27FC236}">
+                <a16:creationId xmlns:a16="http://schemas.microsoft.com/office/drawing/2014/main" id="{AFDAE97A-DB63-430C-A2E5-4B2664166AF7}"/>
+              </a:ext>
+            </a:extLst>
+          </p:cNvPr>
+          <p:cNvPicPr>
+            <a:picLocks noChangeAspect="1"/>
+          </p:cNvPicPr>
+          <p:nvPr/>
+        </p:nvPicPr>
+        <p:blipFill>
+          <a:blip r:embed="rId10">
+            <a:extLst>
+              <a:ext uri="{28A0092B-C50C-407E-A947-70E740481C1C}">
+                <a14:useLocalDpi xmlns:a14="http://schemas.microsoft.com/office/drawing/2010/main" val="0"/>
+              </a:ext>
+              <a:ext uri="{96DAC541-7B7A-43D3-8B79-37D633B846F1}">
+                <asvg:svgBlip xmlns:asvg="http://schemas.microsoft.com/office/drawing/2016/SVG/main" r:embed="rId11"/>
+              </a:ext>
+            </a:extLst>
+          </a:blip>
+          <a:stretch>
+            <a:fillRect/>
+          </a:stretch>
+        </p:blipFill>
+        <p:spPr>
+          <a:xfrm>
+            <a:off x="4501519" y="2903509"/>
+            <a:ext cx="914400" cy="914400"/>
+          </a:xfrm>
+          <a:prstGeom prst="rect">
+            <a:avLst/>
+          </a:prstGeom>
+        </p:spPr>
+      </p:pic>
+      <p:pic>
+        <p:nvPicPr>
+          <p:cNvPr id="38" name="Graphic 37" descr="Group success">
+            <a:extLst>
+              <a:ext uri="{FF2B5EF4-FFF2-40B4-BE49-F238E27FC236}">
+                <a16:creationId xmlns:a16="http://schemas.microsoft.com/office/drawing/2014/main" id="{5186D872-3C3F-4F22-A58D-CDB64501271F}"/>
+              </a:ext>
+            </a:extLst>
+          </p:cNvPr>
+          <p:cNvPicPr>
+            <a:picLocks noChangeAspect="1"/>
+          </p:cNvPicPr>
+          <p:nvPr/>
+        </p:nvPicPr>
+        <p:blipFill>
+          <a:blip r:embed="rId12">
+            <a:extLst>
+              <a:ext uri="{28A0092B-C50C-407E-A947-70E740481C1C}">
+                <a14:useLocalDpi xmlns:a14="http://schemas.microsoft.com/office/drawing/2010/main" val="0"/>
+              </a:ext>
+              <a:ext uri="{96DAC541-7B7A-43D3-8B79-37D633B846F1}">
+                <asvg:svgBlip xmlns:asvg="http://schemas.microsoft.com/office/drawing/2016/SVG/main" r:embed="rId13"/>
+              </a:ext>
+            </a:extLst>
+          </a:blip>
+          <a:stretch>
+            <a:fillRect/>
+          </a:stretch>
+        </p:blipFill>
+        <p:spPr>
+          <a:xfrm>
+            <a:off x="6415964" y="3943297"/>
+            <a:ext cx="914400" cy="914400"/>
+          </a:xfrm>
+          <a:prstGeom prst="rect">
+            <a:avLst/>
+          </a:prstGeom>
+        </p:spPr>
+      </p:pic>
+      <p:sp>
+        <p:nvSpPr>
+          <p:cNvPr id="45" name="Oval 44">
+            <a:extLst>
+              <a:ext uri="{FF2B5EF4-FFF2-40B4-BE49-F238E27FC236}">
+                <a16:creationId xmlns:a16="http://schemas.microsoft.com/office/drawing/2014/main" id="{B8472017-3923-4FBA-8821-1B627EBE8058}"/>
+              </a:ext>
+            </a:extLst>
+          </p:cNvPr>
+          <p:cNvSpPr/>
+          <p:nvPr/>
+        </p:nvSpPr>
+        <p:spPr>
+          <a:xfrm>
+            <a:off x="4121426" y="2504661"/>
+            <a:ext cx="3613908" cy="2702143"/>
+          </a:xfrm>
+          <a:prstGeom prst="ellipse">
+            <a:avLst/>
+          </a:prstGeom>
+          <a:noFill/>
+          <a:ln>
+            <a:solidFill>
+              <a:schemeClr val="tx1"/>
+            </a:solidFill>
+            <a:prstDash val="dash"/>
+          </a:ln>
+        </p:spPr>
+        <p:style>
+          <a:lnRef idx="2">
+            <a:schemeClr val="accent1">
+              <a:shade val="50000"/>
+            </a:schemeClr>
+          </a:lnRef>
+          <a:fillRef idx="1">
+            <a:schemeClr val="accent1"/>
+          </a:fillRef>
+          <a:effectRef idx="0">
+            <a:schemeClr val="accent1"/>
+          </a:effectRef>
+          <a:fontRef idx="minor">
+            <a:schemeClr val="lt1"/>
+          </a:fontRef>
+        </p:style>
+        <p:txBody>
+          <a:bodyPr rtlCol="0" anchor="ctr"/>
+          <a:lstStyle/>
+          <a:p>
+            <a:pPr algn="ctr"/>
+            <a:endParaRPr lang="en-IN"/>
+          </a:p>
+        </p:txBody>
+      </p:sp>
+      <p:sp>
+        <p:nvSpPr>
+          <p:cNvPr id="46" name="TextBox 45">
+            <a:extLst>
+              <a:ext uri="{FF2B5EF4-FFF2-40B4-BE49-F238E27FC236}">
+                <a16:creationId xmlns:a16="http://schemas.microsoft.com/office/drawing/2014/main" id="{E3064DF6-9AB7-4043-96D7-251F6A143767}"/>
+              </a:ext>
+            </a:extLst>
+          </p:cNvPr>
+          <p:cNvSpPr txBox="1"/>
+          <p:nvPr/>
+        </p:nvSpPr>
+        <p:spPr>
+          <a:xfrm>
+            <a:off x="2381335" y="5765996"/>
+            <a:ext cx="1856470" cy="369332"/>
+          </a:xfrm>
+          <a:prstGeom prst="rect">
+            <a:avLst/>
+          </a:prstGeom>
+          <a:noFill/>
+        </p:spPr>
+        <p:txBody>
+          <a:bodyPr wrap="none" rtlCol="0">
+            <a:spAutoFit/>
+          </a:bodyPr>
+          <a:lstStyle/>
+          <a:p>
+            <a:r>
+              <a:rPr lang="en-IN" dirty="0"/>
+              <a:t>Report for Rescue</a:t>
+            </a:r>
+          </a:p>
+        </p:txBody>
+      </p:sp>
+      <p:sp>
+        <p:nvSpPr>
+          <p:cNvPr id="47" name="TextBox 46">
+            <a:extLst>
+              <a:ext uri="{FF2B5EF4-FFF2-40B4-BE49-F238E27FC236}">
+                <a16:creationId xmlns:a16="http://schemas.microsoft.com/office/drawing/2014/main" id="{FD220DCF-FD49-4976-BB87-915652B67B9C}"/>
+              </a:ext>
+            </a:extLst>
+          </p:cNvPr>
+          <p:cNvSpPr txBox="1"/>
+          <p:nvPr/>
+        </p:nvSpPr>
+        <p:spPr>
+          <a:xfrm>
+            <a:off x="7330364" y="5759229"/>
+            <a:ext cx="1856470" cy="369332"/>
+          </a:xfrm>
+          <a:prstGeom prst="rect">
+            <a:avLst/>
+          </a:prstGeom>
+          <a:noFill/>
+        </p:spPr>
+        <p:txBody>
+          <a:bodyPr wrap="none" rtlCol="0">
+            <a:spAutoFit/>
+          </a:bodyPr>
+          <a:lstStyle/>
+          <a:p>
+            <a:r>
+              <a:rPr lang="en-IN" dirty="0"/>
+              <a:t>Report for Rescue</a:t>
+            </a:r>
+          </a:p>
+        </p:txBody>
+      </p:sp>
+      <p:cxnSp>
+        <p:nvCxnSpPr>
+          <p:cNvPr id="49" name="Straight Arrow Connector 48">
+            <a:extLst>
+              <a:ext uri="{FF2B5EF4-FFF2-40B4-BE49-F238E27FC236}">
+                <a16:creationId xmlns:a16="http://schemas.microsoft.com/office/drawing/2014/main" id="{464C00B8-5345-46CC-8F8E-EAFB4CF56C92}"/>
+              </a:ext>
+            </a:extLst>
+          </p:cNvPr>
+          <p:cNvCxnSpPr>
+            <a:cxnSpLocks/>
+            <a:stCxn id="8" idx="2"/>
+            <a:endCxn id="45" idx="0"/>
+          </p:cNvCxnSpPr>
+          <p:nvPr/>
+        </p:nvCxnSpPr>
+        <p:spPr>
+          <a:xfrm>
+            <a:off x="5912902" y="2067067"/>
+            <a:ext cx="3386" cy="437594"/>
+          </a:xfrm>
+          <a:prstGeom prst="straightConnector1">
+            <a:avLst/>
+          </a:prstGeom>
+          <a:ln>
+            <a:solidFill>
+              <a:schemeClr val="tx1"/>
+            </a:solidFill>
+            <a:tailEnd type="triangle"/>
+          </a:ln>
+        </p:spPr>
+        <p:style>
+          <a:lnRef idx="1">
+            <a:schemeClr val="accent1"/>
+          </a:lnRef>
+          <a:fillRef idx="0">
+            <a:schemeClr val="accent1"/>
+          </a:fillRef>
+          <a:effectRef idx="0">
+            <a:schemeClr val="accent1"/>
+          </a:effectRef>
+          <a:fontRef idx="minor">
+            <a:schemeClr val="tx1"/>
+          </a:fontRef>
+        </p:style>
+      </p:cxnSp>
+      <p:pic>
+        <p:nvPicPr>
+          <p:cNvPr id="52" name="Graphic 51" descr="Paw prints">
+            <a:extLst>
+              <a:ext uri="{FF2B5EF4-FFF2-40B4-BE49-F238E27FC236}">
+                <a16:creationId xmlns:a16="http://schemas.microsoft.com/office/drawing/2014/main" id="{87DC273F-D001-4C39-BA63-728442958535}"/>
+              </a:ext>
+            </a:extLst>
+          </p:cNvPr>
+          <p:cNvPicPr>
+            <a:picLocks noChangeAspect="1"/>
+          </p:cNvPicPr>
+          <p:nvPr/>
+        </p:nvPicPr>
+        <p:blipFill>
+          <a:blip r:embed="rId14">
+            <a:extLst>
+              <a:ext uri="{28A0092B-C50C-407E-A947-70E740481C1C}">
+                <a14:useLocalDpi xmlns:a14="http://schemas.microsoft.com/office/drawing/2010/main" val="0"/>
+              </a:ext>
+              <a:ext uri="{96DAC541-7B7A-43D3-8B79-37D633B846F1}">
+                <asvg:svgBlip xmlns:asvg="http://schemas.microsoft.com/office/drawing/2016/SVG/main" r:embed="rId15"/>
+              </a:ext>
+            </a:extLst>
+          </a:blip>
+          <a:stretch>
+            <a:fillRect/>
+          </a:stretch>
+        </p:blipFill>
+        <p:spPr>
+          <a:xfrm>
+            <a:off x="4337517" y="3844310"/>
+            <a:ext cx="914400" cy="914400"/>
+          </a:xfrm>
+          <a:prstGeom prst="rect">
+            <a:avLst/>
+          </a:prstGeom>
+        </p:spPr>
+      </p:pic>
+      <p:sp>
+        <p:nvSpPr>
+          <p:cNvPr id="53" name="TextBox 52">
+            <a:extLst>
+              <a:ext uri="{FF2B5EF4-FFF2-40B4-BE49-F238E27FC236}">
+                <a16:creationId xmlns:a16="http://schemas.microsoft.com/office/drawing/2014/main" id="{AB25098D-9A92-4CFF-83A9-8C32AC12384E}"/>
+              </a:ext>
+            </a:extLst>
+          </p:cNvPr>
+          <p:cNvSpPr txBox="1"/>
+          <p:nvPr/>
+        </p:nvSpPr>
+        <p:spPr>
+          <a:xfrm>
+            <a:off x="1083125" y="2937654"/>
+            <a:ext cx="1585083" cy="369332"/>
+          </a:xfrm>
+          <a:prstGeom prst="rect">
+            <a:avLst/>
+          </a:prstGeom>
+          <a:noFill/>
+        </p:spPr>
+        <p:txBody>
+          <a:bodyPr wrap="square" rtlCol="0">
+            <a:spAutoFit/>
+          </a:bodyPr>
+          <a:lstStyle/>
+          <a:p>
+            <a:r>
+              <a:rPr lang="en-IN" b="1" dirty="0"/>
+              <a:t>Follower Bot</a:t>
+            </a:r>
+          </a:p>
+        </p:txBody>
+      </p:sp>
+      <p:sp>
+        <p:nvSpPr>
+          <p:cNvPr id="54" name="TextBox 53">
+            <a:extLst>
+              <a:ext uri="{FF2B5EF4-FFF2-40B4-BE49-F238E27FC236}">
+                <a16:creationId xmlns:a16="http://schemas.microsoft.com/office/drawing/2014/main" id="{80B67754-6744-4B74-A23F-9A7D2A04D1D0}"/>
+              </a:ext>
+            </a:extLst>
+          </p:cNvPr>
+          <p:cNvSpPr txBox="1"/>
+          <p:nvPr/>
+        </p:nvSpPr>
+        <p:spPr>
+          <a:xfrm>
+            <a:off x="9172423" y="2951325"/>
+            <a:ext cx="1399486" cy="369332"/>
+          </a:xfrm>
+          <a:prstGeom prst="rect">
+            <a:avLst/>
+          </a:prstGeom>
+          <a:noFill/>
+        </p:spPr>
+        <p:txBody>
+          <a:bodyPr wrap="none" rtlCol="0">
+            <a:spAutoFit/>
+          </a:bodyPr>
+          <a:lstStyle/>
+          <a:p>
+            <a:r>
+              <a:rPr lang="en-IN" b="1" dirty="0"/>
+              <a:t>Follower Bot</a:t>
+            </a:r>
+          </a:p>
+        </p:txBody>
+      </p:sp>
+      <p:sp>
+        <p:nvSpPr>
+          <p:cNvPr id="55" name="TextBox 54">
+            <a:extLst>
+              <a:ext uri="{FF2B5EF4-FFF2-40B4-BE49-F238E27FC236}">
+                <a16:creationId xmlns:a16="http://schemas.microsoft.com/office/drawing/2014/main" id="{0914F0B2-A720-444A-BFDF-B041E56A487F}"/>
+              </a:ext>
+            </a:extLst>
+          </p:cNvPr>
+          <p:cNvSpPr txBox="1"/>
+          <p:nvPr/>
+        </p:nvSpPr>
+        <p:spPr>
+          <a:xfrm>
+            <a:off x="5299986" y="716457"/>
+            <a:ext cx="1218603" cy="369332"/>
+          </a:xfrm>
+          <a:prstGeom prst="rect">
+            <a:avLst/>
+          </a:prstGeom>
+          <a:noFill/>
+        </p:spPr>
+        <p:txBody>
+          <a:bodyPr wrap="none" rtlCol="0">
+            <a:spAutoFit/>
+          </a:bodyPr>
+          <a:lstStyle/>
+          <a:p>
+            <a:r>
+              <a:rPr lang="en-IN" b="1" dirty="0"/>
+              <a:t>Leader Bot</a:t>
+            </a:r>
+          </a:p>
+        </p:txBody>
+      </p:sp>
+      <p:sp>
+        <p:nvSpPr>
+          <p:cNvPr id="56" name="TextBox 55">
+            <a:extLst>
+              <a:ext uri="{FF2B5EF4-FFF2-40B4-BE49-F238E27FC236}">
+                <a16:creationId xmlns:a16="http://schemas.microsoft.com/office/drawing/2014/main" id="{8A9465EA-DD45-40EA-9C2A-C1616ACF95F8}"/>
+              </a:ext>
+            </a:extLst>
+          </p:cNvPr>
+          <p:cNvSpPr txBox="1"/>
+          <p:nvPr/>
+        </p:nvSpPr>
+        <p:spPr>
+          <a:xfrm>
+            <a:off x="6027678" y="2112170"/>
+            <a:ext cx="2476447" cy="369332"/>
+          </a:xfrm>
+          <a:prstGeom prst="rect">
+            <a:avLst/>
+          </a:prstGeom>
+          <a:noFill/>
+        </p:spPr>
+        <p:txBody>
+          <a:bodyPr wrap="none" rtlCol="0">
+            <a:spAutoFit/>
+          </a:bodyPr>
+          <a:lstStyle/>
+          <a:p>
+            <a:r>
+              <a:rPr lang="en-IN" dirty="0"/>
+              <a:t>Leader Bot survey’s area</a:t>
+            </a:r>
+          </a:p>
+        </p:txBody>
+      </p:sp>
+      <p:sp>
+        <p:nvSpPr>
+          <p:cNvPr id="57" name="TextBox 56">
+            <a:extLst>
+              <a:ext uri="{FF2B5EF4-FFF2-40B4-BE49-F238E27FC236}">
+                <a16:creationId xmlns:a16="http://schemas.microsoft.com/office/drawing/2014/main" id="{39CD3C38-E60E-4799-8751-5146D8F8626A}"/>
+              </a:ext>
+            </a:extLst>
+          </p:cNvPr>
+          <p:cNvSpPr txBox="1"/>
+          <p:nvPr/>
+        </p:nvSpPr>
+        <p:spPr>
+          <a:xfrm>
+            <a:off x="910318" y="1910257"/>
+            <a:ext cx="2516971" cy="646331"/>
+          </a:xfrm>
+          <a:prstGeom prst="rect">
+            <a:avLst/>
+          </a:prstGeom>
+          <a:noFill/>
+        </p:spPr>
+        <p:txBody>
+          <a:bodyPr wrap="none" rtlCol="0">
+            <a:spAutoFit/>
+          </a:bodyPr>
+          <a:lstStyle/>
+          <a:p>
+            <a:r>
+              <a:rPr lang="en-IN" dirty="0"/>
+              <a:t>Manage and Co-ordinate</a:t>
+            </a:r>
+          </a:p>
+          <a:p>
+            <a:r>
+              <a:rPr lang="en-IN" dirty="0"/>
+              <a:t>with Follower</a:t>
+            </a:r>
+          </a:p>
+        </p:txBody>
+      </p:sp>
+      <p:sp>
+        <p:nvSpPr>
+          <p:cNvPr id="58" name="TextBox 57">
+            <a:extLst>
+              <a:ext uri="{FF2B5EF4-FFF2-40B4-BE49-F238E27FC236}">
+                <a16:creationId xmlns:a16="http://schemas.microsoft.com/office/drawing/2014/main" id="{6A89D95B-4F93-42DB-A8D1-58D0966BC6A6}"/>
+              </a:ext>
+            </a:extLst>
+          </p:cNvPr>
+          <p:cNvSpPr txBox="1"/>
+          <p:nvPr/>
+        </p:nvSpPr>
+        <p:spPr>
+          <a:xfrm>
+            <a:off x="8688183" y="2022923"/>
+            <a:ext cx="2516971" cy="646331"/>
+          </a:xfrm>
+          <a:prstGeom prst="rect">
+            <a:avLst/>
+          </a:prstGeom>
+          <a:noFill/>
+        </p:spPr>
+        <p:txBody>
+          <a:bodyPr wrap="none" rtlCol="0">
+            <a:spAutoFit/>
+          </a:bodyPr>
+          <a:lstStyle/>
+          <a:p>
+            <a:r>
+              <a:rPr lang="en-IN" dirty="0"/>
+              <a:t>Manage and Co-ordinate</a:t>
+            </a:r>
+          </a:p>
+          <a:p>
+            <a:r>
+              <a:rPr lang="en-IN" dirty="0"/>
+              <a:t>with Follower</a:t>
+            </a:r>
+          </a:p>
+        </p:txBody>
+      </p:sp>
+      <p:cxnSp>
+        <p:nvCxnSpPr>
+          <p:cNvPr id="64" name="Connector: Elbow 63">
+            <a:extLst>
+              <a:ext uri="{FF2B5EF4-FFF2-40B4-BE49-F238E27FC236}">
+                <a16:creationId xmlns:a16="http://schemas.microsoft.com/office/drawing/2014/main" id="{B821EB2A-F027-4FE7-A256-15117E861393}"/>
+              </a:ext>
+            </a:extLst>
+          </p:cNvPr>
+          <p:cNvCxnSpPr>
+            <a:stCxn id="6" idx="3"/>
+            <a:endCxn id="45" idx="3"/>
+          </p:cNvCxnSpPr>
+          <p:nvPr/>
+        </p:nvCxnSpPr>
+        <p:spPr>
+          <a:xfrm>
+            <a:off x="2804742" y="3852055"/>
+            <a:ext cx="1845929" cy="959029"/>
+          </a:xfrm>
+          <a:prstGeom prst="bentConnector4">
+            <a:avLst>
+              <a:gd name="adj1" fmla="val 35665"/>
+              <a:gd name="adj2" fmla="val 123837"/>
+            </a:avLst>
+          </a:prstGeom>
+          <a:ln>
+            <a:solidFill>
+              <a:srgbClr val="FF0000"/>
+            </a:solidFill>
+            <a:tailEnd type="triangle"/>
+          </a:ln>
+        </p:spPr>
+        <p:style>
+          <a:lnRef idx="1">
+            <a:schemeClr val="accent1"/>
+          </a:lnRef>
+          <a:fillRef idx="0">
+            <a:schemeClr val="accent1"/>
+          </a:fillRef>
+          <a:effectRef idx="0">
+            <a:schemeClr val="accent1"/>
+          </a:effectRef>
+          <a:fontRef idx="minor">
+            <a:schemeClr val="tx1"/>
+          </a:fontRef>
+        </p:style>
+      </p:cxnSp>
+      <p:cxnSp>
+        <p:nvCxnSpPr>
+          <p:cNvPr id="66" name="Connector: Elbow 65">
+            <a:extLst>
+              <a:ext uri="{FF2B5EF4-FFF2-40B4-BE49-F238E27FC236}">
+                <a16:creationId xmlns:a16="http://schemas.microsoft.com/office/drawing/2014/main" id="{118BEA3B-114D-4BE2-80B5-2C14DBAC573C}"/>
+              </a:ext>
+            </a:extLst>
+          </p:cNvPr>
+          <p:cNvCxnSpPr>
+            <a:stCxn id="9" idx="1"/>
+            <a:endCxn id="45" idx="5"/>
+          </p:cNvCxnSpPr>
+          <p:nvPr/>
+        </p:nvCxnSpPr>
+        <p:spPr>
+          <a:xfrm rot="10800000" flipV="1">
+            <a:off x="7206090" y="3852054"/>
+            <a:ext cx="1908603" cy="959029"/>
+          </a:xfrm>
+          <a:prstGeom prst="bentConnector4">
+            <a:avLst>
+              <a:gd name="adj1" fmla="val 36135"/>
+              <a:gd name="adj2" fmla="val 127790"/>
+            </a:avLst>
+          </a:prstGeom>
+          <a:ln>
+            <a:solidFill>
+              <a:srgbClr val="FF0000"/>
+            </a:solidFill>
+            <a:tailEnd type="triangle"/>
+          </a:ln>
+        </p:spPr>
+        <p:style>
+          <a:lnRef idx="1">
+            <a:schemeClr val="accent1"/>
+          </a:lnRef>
+          <a:fillRef idx="0">
+            <a:schemeClr val="accent1"/>
+          </a:fillRef>
+          <a:effectRef idx="0">
+            <a:schemeClr val="accent1"/>
+          </a:effectRef>
+          <a:fontRef idx="minor">
+            <a:schemeClr val="tx1"/>
+          </a:fontRef>
+        </p:style>
+      </p:cxnSp>
+      <p:sp>
+        <p:nvSpPr>
+          <p:cNvPr id="68" name="TextBox 67">
+            <a:extLst>
+              <a:ext uri="{FF2B5EF4-FFF2-40B4-BE49-F238E27FC236}">
+                <a16:creationId xmlns:a16="http://schemas.microsoft.com/office/drawing/2014/main" id="{5A895E73-086C-414C-88A6-842B92BF32EC}"/>
+              </a:ext>
+            </a:extLst>
+          </p:cNvPr>
+          <p:cNvSpPr txBox="1"/>
+          <p:nvPr/>
+        </p:nvSpPr>
+        <p:spPr>
+          <a:xfrm>
+            <a:off x="2763220" y="5110006"/>
+            <a:ext cx="1734577" cy="369332"/>
+          </a:xfrm>
+          <a:prstGeom prst="rect">
+            <a:avLst/>
+          </a:prstGeom>
+          <a:noFill/>
+        </p:spPr>
+        <p:txBody>
+          <a:bodyPr wrap="none" rtlCol="0">
+            <a:spAutoFit/>
+          </a:bodyPr>
+          <a:lstStyle/>
+          <a:p>
+            <a:r>
+              <a:rPr lang="en-IN" dirty="0"/>
+              <a:t>Identify Rescuee</a:t>
+            </a:r>
+          </a:p>
+        </p:txBody>
+      </p:sp>
+      <p:sp>
+        <p:nvSpPr>
+          <p:cNvPr id="69" name="TextBox 68">
+            <a:extLst>
+              <a:ext uri="{FF2B5EF4-FFF2-40B4-BE49-F238E27FC236}">
+                <a16:creationId xmlns:a16="http://schemas.microsoft.com/office/drawing/2014/main" id="{E14F26AC-BAC5-47D4-83DC-354537443FFF}"/>
+              </a:ext>
+            </a:extLst>
+          </p:cNvPr>
+          <p:cNvSpPr txBox="1"/>
+          <p:nvPr/>
+        </p:nvSpPr>
+        <p:spPr>
+          <a:xfrm>
+            <a:off x="7124625" y="5142897"/>
+            <a:ext cx="1734577" cy="369332"/>
+          </a:xfrm>
+          <a:prstGeom prst="rect">
+            <a:avLst/>
+          </a:prstGeom>
+          <a:noFill/>
+        </p:spPr>
+        <p:txBody>
+          <a:bodyPr wrap="none" rtlCol="0">
+            <a:spAutoFit/>
+          </a:bodyPr>
+          <a:lstStyle/>
+          <a:p>
+            <a:r>
+              <a:rPr lang="en-IN" dirty="0"/>
+              <a:t>Identify Rescuee</a:t>
+            </a:r>
+          </a:p>
+        </p:txBody>
+      </p:sp>
     </p:spTree>
     <p:extLst>
       <p:ext uri="{BB962C8B-B14F-4D97-AF65-F5344CB8AC3E}">
-        <p14:creationId xmlns:p14="http://schemas.microsoft.com/office/powerpoint/2010/main" val="2872485557"/>
+        <p14:creationId xmlns:p14="http://schemas.microsoft.com/office/powerpoint/2010/main" val="3320483110"/>
       </p:ext>
     </p:extLst>
   </p:cSld>
@@ -5051,22 +6143,22 @@
         <p:spPr>
           <a:xfrm>
             <a:off x="838200" y="180204"/>
-            <a:ext cx="10515600" cy="770654"/>
+            <a:ext cx="10515600" cy="495657"/>
           </a:xfrm>
         </p:spPr>
         <p:txBody>
           <a:bodyPr>
-            <a:normAutofit/>
+            <a:normAutofit fontScale="90000"/>
           </a:bodyPr>
           <a:lstStyle/>
           <a:p>
             <a:r>
-              <a:rPr lang="en-IN" sz="4000" b="1" dirty="0">
+              <a:rPr lang="en-IN" sz="3200" b="1" dirty="0">
                 <a:solidFill>
                   <a:srgbClr val="002060"/>
                 </a:solidFill>
               </a:rPr>
-              <a:t>Leader-Follower Role</a:t>
+              <a:t>Leader Role</a:t>
             </a:r>
           </a:p>
         </p:txBody>
@@ -5103,10 +6195,10 @@
       </p:pic>
       <p:pic>
         <p:nvPicPr>
-          <p:cNvPr id="8" name="Picture 7" descr="A screenshot of a social media post&#10;&#10;Description automatically generated">
-            <a:extLst>
-              <a:ext uri="{FF2B5EF4-FFF2-40B4-BE49-F238E27FC236}">
-                <a16:creationId xmlns:a16="http://schemas.microsoft.com/office/drawing/2014/main" id="{AB197C3A-CF73-4762-931C-3BBB51E512DB}"/>
+          <p:cNvPr id="7" name="Picture 6" descr="A screenshot of a cell phone&#10;&#10;Description automatically generated">
+            <a:extLst>
+              <a:ext uri="{FF2B5EF4-FFF2-40B4-BE49-F238E27FC236}">
+                <a16:creationId xmlns:a16="http://schemas.microsoft.com/office/drawing/2014/main" id="{00EB4A33-B195-4F49-8CF0-A78482EA09BC}"/>
               </a:ext>
             </a:extLst>
           </p:cNvPr>
@@ -5129,8 +6221,8 @@
         </p:blipFill>
         <p:spPr>
           <a:xfrm>
-            <a:off x="672297" y="1307033"/>
-            <a:ext cx="10847405" cy="5065632"/>
+            <a:off x="1152489" y="1266809"/>
+            <a:ext cx="9887022" cy="4324382"/>
           </a:xfrm>
           <a:prstGeom prst="rect">
             <a:avLst/>
@@ -5186,22 +6278,22 @@
         <p:spPr>
           <a:xfrm>
             <a:off x="838200" y="180204"/>
-            <a:ext cx="10515600" cy="770654"/>
+            <a:ext cx="10515600" cy="495657"/>
           </a:xfrm>
         </p:spPr>
         <p:txBody>
           <a:bodyPr>
-            <a:normAutofit/>
+            <a:normAutofit fontScale="90000"/>
           </a:bodyPr>
           <a:lstStyle/>
           <a:p>
             <a:r>
-              <a:rPr lang="en-IN" sz="4000" b="1" dirty="0">
+              <a:rPr lang="en-IN" sz="3200" b="1" dirty="0">
                 <a:solidFill>
                   <a:srgbClr val="002060"/>
                 </a:solidFill>
               </a:rPr>
-              <a:t>Leader-Follower Role</a:t>
+              <a:t>Follower Role</a:t>
             </a:r>
           </a:p>
         </p:txBody>
@@ -5238,10 +6330,10 @@
       </p:pic>
       <p:pic>
         <p:nvPicPr>
-          <p:cNvPr id="5" name="Picture 4" descr="A close up of a map&#10;&#10;Description automatically generated">
-            <a:extLst>
-              <a:ext uri="{FF2B5EF4-FFF2-40B4-BE49-F238E27FC236}">
-                <a16:creationId xmlns:a16="http://schemas.microsoft.com/office/drawing/2014/main" id="{E1C51DDE-0CC3-4D93-B3B9-EFA092FC6B7C}"/>
+          <p:cNvPr id="5" name="Picture 4" descr="A picture containing screenshot&#10;&#10;Description automatically generated">
+            <a:extLst>
+              <a:ext uri="{FF2B5EF4-FFF2-40B4-BE49-F238E27FC236}">
+                <a16:creationId xmlns:a16="http://schemas.microsoft.com/office/drawing/2014/main" id="{AC2AA813-F9B7-44B3-83B9-B43D926F060A}"/>
               </a:ext>
             </a:extLst>
           </p:cNvPr>
@@ -5264,8 +6356,8 @@
         </p:blipFill>
         <p:spPr>
           <a:xfrm>
-            <a:off x="4698609" y="1425587"/>
-            <a:ext cx="7335274" cy="4372585"/>
+            <a:off x="2909679" y="1012930"/>
+            <a:ext cx="6372642" cy="5453850"/>
           </a:xfrm>
           <a:prstGeom prst="rect">
             <a:avLst/>
@@ -5275,7 +6367,7 @@
     </p:spTree>
     <p:extLst>
       <p:ext uri="{BB962C8B-B14F-4D97-AF65-F5344CB8AC3E}">
-        <p14:creationId xmlns:p14="http://schemas.microsoft.com/office/powerpoint/2010/main" val="2639749263"/>
+        <p14:creationId xmlns:p14="http://schemas.microsoft.com/office/powerpoint/2010/main" val="3655974285"/>
       </p:ext>
     </p:extLst>
   </p:cSld>
@@ -5321,22 +6413,22 @@
         <p:spPr>
           <a:xfrm>
             <a:off x="838200" y="180204"/>
-            <a:ext cx="10515600" cy="770654"/>
+            <a:ext cx="10515600" cy="508909"/>
           </a:xfrm>
         </p:spPr>
         <p:txBody>
           <a:bodyPr>
-            <a:normAutofit/>
+            <a:normAutofit fontScale="90000"/>
           </a:bodyPr>
           <a:lstStyle/>
           <a:p>
             <a:r>
-              <a:rPr lang="en-IN" sz="4000" b="1" dirty="0">
+              <a:rPr lang="en-IN" sz="3200" b="1" dirty="0">
                 <a:solidFill>
                   <a:srgbClr val="002060"/>
                 </a:solidFill>
               </a:rPr>
-              <a:t>Leader-Follower Role</a:t>
+              <a:t>Leader-Follower Sequence Diagram</a:t>
             </a:r>
           </a:p>
         </p:txBody>
@@ -5373,10 +6465,10 @@
       </p:pic>
       <p:pic>
         <p:nvPicPr>
-          <p:cNvPr id="6" name="Picture 5" descr="A close up of a map&#10;&#10;Description automatically generated">
-            <a:extLst>
-              <a:ext uri="{FF2B5EF4-FFF2-40B4-BE49-F238E27FC236}">
-                <a16:creationId xmlns:a16="http://schemas.microsoft.com/office/drawing/2014/main" id="{F6EDFC11-7331-4C44-B913-3D0548230460}"/>
+          <p:cNvPr id="9" name="Picture 8" descr="A close up of a map&#10;&#10;Description automatically generated">
+            <a:extLst>
+              <a:ext uri="{FF2B5EF4-FFF2-40B4-BE49-F238E27FC236}">
+                <a16:creationId xmlns:a16="http://schemas.microsoft.com/office/drawing/2014/main" id="{FE6B3A2C-E608-45FA-B70F-EF8F00BC548E}"/>
               </a:ext>
             </a:extLst>
           </p:cNvPr>
@@ -5399,8 +6491,8 @@
         </p:blipFill>
         <p:spPr>
           <a:xfrm>
-            <a:off x="5999886" y="1458485"/>
-            <a:ext cx="6192114" cy="4363059"/>
+            <a:off x="2145506" y="689113"/>
+            <a:ext cx="7900987" cy="6168887"/>
           </a:xfrm>
           <a:prstGeom prst="rect">
             <a:avLst/>
@@ -5410,7 +6502,7 @@
     </p:spTree>
     <p:extLst>
       <p:ext uri="{BB962C8B-B14F-4D97-AF65-F5344CB8AC3E}">
-        <p14:creationId xmlns:p14="http://schemas.microsoft.com/office/powerpoint/2010/main" val="1555292342"/>
+        <p14:creationId xmlns:p14="http://schemas.microsoft.com/office/powerpoint/2010/main" val="1873749154"/>
       </p:ext>
     </p:extLst>
   </p:cSld>
@@ -5456,22 +6548,22 @@
         <p:spPr>
           <a:xfrm>
             <a:off x="838200" y="180204"/>
-            <a:ext cx="10515600" cy="770654"/>
+            <a:ext cx="10515600" cy="508909"/>
           </a:xfrm>
         </p:spPr>
         <p:txBody>
           <a:bodyPr>
-            <a:normAutofit/>
+            <a:normAutofit fontScale="90000"/>
           </a:bodyPr>
           <a:lstStyle/>
           <a:p>
             <a:r>
-              <a:rPr lang="en-IN" sz="4000" b="1" dirty="0">
+              <a:rPr lang="en-IN" sz="3200" b="1" dirty="0">
                 <a:solidFill>
                   <a:srgbClr val="002060"/>
                 </a:solidFill>
               </a:rPr>
-              <a:t>Rescue Scenario</a:t>
+              <a:t>Leader-Follower Real-Time State Chart</a:t>
             </a:r>
           </a:p>
         </p:txBody>
@@ -5508,10 +6600,10 @@
       </p:pic>
       <p:pic>
         <p:nvPicPr>
-          <p:cNvPr id="5" name="Picture 4" descr="A screenshot of a cell phone&#10;&#10;Description automatically generated">
-            <a:extLst>
-              <a:ext uri="{FF2B5EF4-FFF2-40B4-BE49-F238E27FC236}">
-                <a16:creationId xmlns:a16="http://schemas.microsoft.com/office/drawing/2014/main" id="{CFA071EC-7A81-411A-8C7B-99F20C076046}"/>
+          <p:cNvPr id="5" name="Picture 4" descr="A close up of a map&#10;&#10;Description automatically generated">
+            <a:extLst>
+              <a:ext uri="{FF2B5EF4-FFF2-40B4-BE49-F238E27FC236}">
+                <a16:creationId xmlns:a16="http://schemas.microsoft.com/office/drawing/2014/main" id="{E1C51DDE-0CC3-4D93-B3B9-EFA092FC6B7C}"/>
               </a:ext>
             </a:extLst>
           </p:cNvPr>
@@ -5534,18 +6626,124 @@
         </p:blipFill>
         <p:spPr>
           <a:xfrm>
-            <a:off x="1145249" y="1131062"/>
-            <a:ext cx="9901502" cy="4953310"/>
+            <a:off x="0" y="1242707"/>
+            <a:ext cx="6493556" cy="3872411"/>
           </a:xfrm>
           <a:prstGeom prst="rect">
             <a:avLst/>
           </a:prstGeom>
         </p:spPr>
       </p:pic>
+      <p:pic>
+        <p:nvPicPr>
+          <p:cNvPr id="6" name="Picture 5" descr="A close up of a map&#10;&#10;Description automatically generated">
+            <a:extLst>
+              <a:ext uri="{FF2B5EF4-FFF2-40B4-BE49-F238E27FC236}">
+                <a16:creationId xmlns:a16="http://schemas.microsoft.com/office/drawing/2014/main" id="{85D2B6F3-7F6B-4D06-B100-D97B993C53CC}"/>
+              </a:ext>
+            </a:extLst>
+          </p:cNvPr>
+          <p:cNvPicPr>
+            <a:picLocks noChangeAspect="1"/>
+          </p:cNvPicPr>
+          <p:nvPr/>
+        </p:nvPicPr>
+        <p:blipFill>
+          <a:blip r:embed="rId4">
+            <a:extLst>
+              <a:ext uri="{28A0092B-C50C-407E-A947-70E740481C1C}">
+                <a14:useLocalDpi xmlns:a14="http://schemas.microsoft.com/office/drawing/2010/main" val="0"/>
+              </a:ext>
+            </a:extLst>
+          </a:blip>
+          <a:stretch>
+            <a:fillRect/>
+          </a:stretch>
+        </p:blipFill>
+        <p:spPr>
+          <a:xfrm>
+            <a:off x="6724356" y="1448640"/>
+            <a:ext cx="5495779" cy="3872411"/>
+          </a:xfrm>
+          <a:prstGeom prst="rect">
+            <a:avLst/>
+          </a:prstGeom>
+        </p:spPr>
+      </p:pic>
+      <p:sp>
+        <p:nvSpPr>
+          <p:cNvPr id="3" name="TextBox 2">
+            <a:extLst>
+              <a:ext uri="{FF2B5EF4-FFF2-40B4-BE49-F238E27FC236}">
+                <a16:creationId xmlns:a16="http://schemas.microsoft.com/office/drawing/2014/main" id="{D5345EFD-3057-4B62-A76F-1EE682798CE2}"/>
+              </a:ext>
+            </a:extLst>
+          </p:cNvPr>
+          <p:cNvSpPr txBox="1"/>
+          <p:nvPr/>
+        </p:nvSpPr>
+        <p:spPr>
+          <a:xfrm>
+            <a:off x="2054087" y="5321051"/>
+            <a:ext cx="1465209" cy="369332"/>
+          </a:xfrm>
+          <a:prstGeom prst="rect">
+            <a:avLst/>
+          </a:prstGeom>
+          <a:noFill/>
+        </p:spPr>
+        <p:txBody>
+          <a:bodyPr wrap="none" rtlCol="0">
+            <a:spAutoFit/>
+          </a:bodyPr>
+          <a:lstStyle/>
+          <a:p>
+            <a:r>
+              <a:rPr lang="en-IN" b="1" dirty="0"/>
+              <a:t>LEADER ROLE</a:t>
+            </a:r>
+          </a:p>
+        </p:txBody>
+      </p:sp>
+      <p:sp>
+        <p:nvSpPr>
+          <p:cNvPr id="7" name="TextBox 6">
+            <a:extLst>
+              <a:ext uri="{FF2B5EF4-FFF2-40B4-BE49-F238E27FC236}">
+                <a16:creationId xmlns:a16="http://schemas.microsoft.com/office/drawing/2014/main" id="{AA9E8BC7-46DE-413E-9F4E-5150B303EB39}"/>
+              </a:ext>
+            </a:extLst>
+          </p:cNvPr>
+          <p:cNvSpPr txBox="1"/>
+          <p:nvPr/>
+        </p:nvSpPr>
+        <p:spPr>
+          <a:xfrm>
+            <a:off x="8757852" y="5321051"/>
+            <a:ext cx="1786515" cy="369332"/>
+          </a:xfrm>
+          <a:prstGeom prst="rect">
+            <a:avLst/>
+          </a:prstGeom>
+          <a:noFill/>
+        </p:spPr>
+        <p:txBody>
+          <a:bodyPr wrap="none" rtlCol="0">
+            <a:spAutoFit/>
+          </a:bodyPr>
+          <a:lstStyle/>
+          <a:p>
+            <a:r>
+              <a:rPr lang="en-IN" b="1" dirty="0"/>
+              <a:t>FOLLOWER ROLE</a:t>
+            </a:r>
+          </a:p>
+        </p:txBody>
+      </p:sp>
     </p:spTree>
     <p:extLst>
       <p:ext uri="{BB962C8B-B14F-4D97-AF65-F5344CB8AC3E}">
-        <p14:creationId xmlns:p14="http://schemas.microsoft.com/office/powerpoint/2010/main" val="322969460"/>
+        <p14:creationId xmlns:p14="http://schemas.microsoft.com/office/powerpoint/2010/main" val="2639749263"/>
       </p:ext>
     </p:extLst>
   </p:cSld>
@@ -5558,6 +6756,14 @@
 <file path=ppt/slides/slide2.xml><?xml version="1.0" encoding="utf-8"?>
 <p:sld xmlns:a="http://schemas.openxmlformats.org/drawingml/2006/main" xmlns:r="http://schemas.openxmlformats.org/officeDocument/2006/relationships" xmlns:p="http://schemas.openxmlformats.org/presentationml/2006/main">
   <p:cSld>
+    <p:bg>
+      <p:bgPr>
+        <a:solidFill>
+          <a:schemeClr val="bg1"/>
+        </a:solidFill>
+        <a:effectLst/>
+      </p:bgPr>
+    </p:bg>
     <p:spTree>
       <p:nvGrpSpPr>
         <p:cNvPr id="1" name=""/>
@@ -5572,6 +6778,87 @@
           <a:chExt cx="0" cy="0"/>
         </a:xfrm>
       </p:grpSpPr>
+      <p:pic>
+        <p:nvPicPr>
+          <p:cNvPr id="13" name="Picture 12" descr="A picture containing clock&#10;&#10;Description automatically generated">
+            <a:extLst>
+              <a:ext uri="{FF2B5EF4-FFF2-40B4-BE49-F238E27FC236}">
+                <a16:creationId xmlns:a16="http://schemas.microsoft.com/office/drawing/2014/main" id="{03C4BF0C-2AA4-481C-88C1-054CFE689F72}"/>
+              </a:ext>
+            </a:extLst>
+          </p:cNvPr>
+          <p:cNvPicPr>
+            <a:picLocks noChangeAspect="1"/>
+          </p:cNvPicPr>
+          <p:nvPr/>
+        </p:nvPicPr>
+        <p:blipFill rotWithShape="1">
+          <a:blip r:embed="rId2">
+            <a:alphaModFix/>
+            <a:extLst>
+              <a:ext uri="{28A0092B-C50C-407E-A947-70E740481C1C}">
+                <a14:useLocalDpi xmlns:a14="http://schemas.microsoft.com/office/drawing/2010/main" val="0"/>
+              </a:ext>
+            </a:extLst>
+          </a:blip>
+          <a:srcRect t="23429" r="-2" b="16239"/>
+          <a:stretch/>
+        </p:blipFill>
+        <p:spPr>
+          <a:xfrm>
+            <a:off x="5797543" y="10"/>
+            <a:ext cx="6394152" cy="6857990"/>
+          </a:xfrm>
+          <a:prstGeom prst="rect">
+            <a:avLst/>
+          </a:prstGeom>
+        </p:spPr>
+      </p:pic>
+      <p:pic>
+        <p:nvPicPr>
+          <p:cNvPr id="31" name="Picture 30">
+            <a:extLst>
+              <a:ext uri="{FF2B5EF4-FFF2-40B4-BE49-F238E27FC236}">
+                <a16:creationId xmlns:a16="http://schemas.microsoft.com/office/drawing/2014/main" id="{54DDEBDD-D8BD-41A6-8A0D-B00E3768B0F9}"/>
+              </a:ext>
+              <a:ext uri="{C183D7F6-B498-43B3-948B-1728B52AA6E4}">
+                <adec:decorative xmlns:adec="http://schemas.microsoft.com/office/drawing/2017/decorative" val="1"/>
+              </a:ext>
+            </a:extLst>
+          </p:cNvPr>
+          <p:cNvPicPr>
+            <a:picLocks noGrp="1" noRot="1" noChangeAspect="1" noMove="1" noResize="1" noEditPoints="1" noAdjustHandles="1" noChangeArrowheads="1" noChangeShapeType="1" noCrop="1"/>
+          </p:cNvPicPr>
+          <p:nvPr>
+            <p:extLst>
+              <p:ext uri="{386F3935-93C4-4BCD-93E2-E3B085C9AB24}">
+                <p16:designElem xmlns:p16="http://schemas.microsoft.com/office/powerpoint/2015/main" val="1"/>
+              </p:ext>
+            </p:extLst>
+          </p:nvPr>
+        </p:nvPicPr>
+        <p:blipFill>
+          <a:blip r:embed="rId3">
+            <a:extLst>
+              <a:ext uri="{28A0092B-C50C-407E-A947-70E740481C1C}">
+                <a14:useLocalDpi xmlns:a14="http://schemas.microsoft.com/office/drawing/2010/main" val="0"/>
+              </a:ext>
+            </a:extLst>
+          </a:blip>
+          <a:stretch>
+            <a:fillRect/>
+          </a:stretch>
+        </p:blipFill>
+        <p:spPr>
+          <a:xfrm flipH="1" flipV="1">
+            <a:off x="0" y="0"/>
+            <a:ext cx="12192000" cy="6858000"/>
+          </a:xfrm>
+          <a:prstGeom prst="rect">
+            <a:avLst/>
+          </a:prstGeom>
+        </p:spPr>
+      </p:pic>
       <p:sp>
         <p:nvSpPr>
           <p:cNvPr id="2" name="Title 1">
@@ -5590,8 +6877,8 @@
         </p:nvSpPr>
         <p:spPr>
           <a:xfrm>
-            <a:off x="838200" y="249262"/>
-            <a:ext cx="10515600" cy="846112"/>
+            <a:off x="804998" y="798445"/>
+            <a:ext cx="4803636" cy="1311664"/>
           </a:xfrm>
         </p:spPr>
         <p:txBody>
@@ -5601,13 +6888,114 @@
           <a:lstStyle/>
           <a:p>
             <a:r>
-              <a:rPr lang="en-IN" sz="4000" b="1" dirty="0">
+              <a:rPr lang="en-IN" b="1" dirty="0">
                 <a:solidFill>
-                  <a:srgbClr val="002060"/>
+                  <a:schemeClr val="accent1">
+                    <a:lumMod val="50000"/>
+                  </a:schemeClr>
                 </a:solidFill>
               </a:rPr>
-              <a:t>Motivation</a:t>
-            </a:r>
+              <a:t>Objectives</a:t>
+            </a:r>
+          </a:p>
+        </p:txBody>
+      </p:sp>
+      <p:sp>
+        <p:nvSpPr>
+          <p:cNvPr id="11" name="Content Placeholder 10">
+            <a:extLst>
+              <a:ext uri="{FF2B5EF4-FFF2-40B4-BE49-F238E27FC236}">
+                <a16:creationId xmlns:a16="http://schemas.microsoft.com/office/drawing/2014/main" id="{456D7847-6C10-43B0-9F46-6E91C4A34A1A}"/>
+              </a:ext>
+            </a:extLst>
+          </p:cNvPr>
+          <p:cNvSpPr>
+            <a:spLocks noGrp="1"/>
+          </p:cNvSpPr>
+          <p:nvPr>
+            <p:ph idx="1"/>
+          </p:nvPr>
+        </p:nvSpPr>
+        <p:spPr>
+          <a:xfrm>
+            <a:off x="804997" y="2272143"/>
+            <a:ext cx="4706803" cy="3788830"/>
+          </a:xfrm>
+        </p:spPr>
+        <p:txBody>
+          <a:bodyPr anchor="ctr">
+            <a:normAutofit/>
+          </a:bodyPr>
+          <a:lstStyle/>
+          <a:p>
+            <a:pPr>
+              <a:buFont typeface="Wingdings" panose="05000000000000000000" pitchFamily="2" charset="2"/>
+              <a:buChar char="Ø"/>
+            </a:pPr>
+            <a:r>
+              <a:rPr lang="en-IN" sz="2000" dirty="0">
+                <a:solidFill>
+                  <a:srgbClr val="000000"/>
+                </a:solidFill>
+              </a:rPr>
+              <a:t>Develop Rescue Robot for assistance in recovery and exploration of dangerous areas.</a:t>
+            </a:r>
+          </a:p>
+          <a:p>
+            <a:pPr>
+              <a:buFont typeface="Wingdings" panose="05000000000000000000" pitchFamily="2" charset="2"/>
+              <a:buChar char="Ø"/>
+            </a:pPr>
+            <a:r>
+              <a:rPr lang="en-IN" sz="2000" dirty="0">
+                <a:solidFill>
+                  <a:srgbClr val="000000"/>
+                </a:solidFill>
+              </a:rPr>
+              <a:t>Rescue Robot must be able to drive in water.</a:t>
+            </a:r>
+          </a:p>
+          <a:p>
+            <a:pPr>
+              <a:buFont typeface="Wingdings" panose="05000000000000000000" pitchFamily="2" charset="2"/>
+              <a:buChar char="Ø"/>
+            </a:pPr>
+            <a:r>
+              <a:rPr lang="en-IN" sz="2000" dirty="0">
+                <a:solidFill>
+                  <a:srgbClr val="000000"/>
+                </a:solidFill>
+              </a:rPr>
+              <a:t>It should have to capability to adapt to environmental changes.</a:t>
+            </a:r>
+          </a:p>
+          <a:p>
+            <a:pPr>
+              <a:buFont typeface="Wingdings" panose="05000000000000000000" pitchFamily="2" charset="2"/>
+              <a:buChar char="Ø"/>
+            </a:pPr>
+            <a:r>
+              <a:rPr lang="en-IN" sz="2000" dirty="0">
+                <a:solidFill>
+                  <a:srgbClr val="000000"/>
+                </a:solidFill>
+              </a:rPr>
+              <a:t>Capable of working in community.</a:t>
+            </a:r>
+          </a:p>
+          <a:p>
+            <a:endParaRPr lang="en-IN" sz="2000" dirty="0">
+              <a:solidFill>
+                <a:srgbClr val="000000"/>
+              </a:solidFill>
+            </a:endParaRPr>
+          </a:p>
+          <a:p>
+            <a:endParaRPr lang="en-IN" sz="2000" dirty="0">
+              <a:solidFill>
+                <a:srgbClr val="000000"/>
+              </a:solidFill>
+            </a:endParaRPr>
           </a:p>
         </p:txBody>
       </p:sp>
@@ -5626,7 +7014,7 @@
           <p:nvPr/>
         </p:nvPicPr>
         <p:blipFill>
-          <a:blip r:embed="rId2"/>
+          <a:blip r:embed="rId4"/>
           <a:stretch>
             <a:fillRect/>
           </a:stretch>
@@ -5641,31 +7029,6 @@
           </a:prstGeom>
         </p:spPr>
       </p:pic>
-      <p:sp>
-        <p:nvSpPr>
-          <p:cNvPr id="4" name="Content Placeholder 3">
-            <a:extLst>
-              <a:ext uri="{FF2B5EF4-FFF2-40B4-BE49-F238E27FC236}">
-                <a16:creationId xmlns:a16="http://schemas.microsoft.com/office/drawing/2014/main" id="{CC02EAC5-1169-447C-91B9-993DBFEEECDE}"/>
-              </a:ext>
-            </a:extLst>
-          </p:cNvPr>
-          <p:cNvSpPr>
-            <a:spLocks noGrp="1"/>
-          </p:cNvSpPr>
-          <p:nvPr>
-            <p:ph idx="1"/>
-          </p:nvPr>
-        </p:nvSpPr>
-        <p:spPr/>
-        <p:txBody>
-          <a:bodyPr/>
-          <a:lstStyle/>
-          <a:p>
-            <a:endParaRPr lang="en-IN" dirty="0"/>
-          </a:p>
-        </p:txBody>
-      </p:sp>
     </p:spTree>
     <p:extLst>
       <p:ext uri="{BB962C8B-B14F-4D97-AF65-F5344CB8AC3E}">
@@ -5714,6 +7077,141 @@
         </p:nvSpPr>
         <p:spPr>
           <a:xfrm>
+            <a:off x="930965" y="175226"/>
+            <a:ext cx="10515600" cy="495657"/>
+          </a:xfrm>
+        </p:spPr>
+        <p:txBody>
+          <a:bodyPr>
+            <a:normAutofit fontScale="90000"/>
+          </a:bodyPr>
+          <a:lstStyle/>
+          <a:p>
+            <a:r>
+              <a:rPr lang="en-IN" sz="3200" b="1" dirty="0">
+                <a:solidFill>
+                  <a:srgbClr val="002060"/>
+                </a:solidFill>
+              </a:rPr>
+              <a:t>Leader-Follower Co-ordination</a:t>
+            </a:r>
+          </a:p>
+        </p:txBody>
+      </p:sp>
+      <p:pic>
+        <p:nvPicPr>
+          <p:cNvPr id="4" name="Picture 3" descr="A picture containing knife&#10;&#10;Description automatically generated">
+            <a:extLst>
+              <a:ext uri="{FF2B5EF4-FFF2-40B4-BE49-F238E27FC236}">
+                <a16:creationId xmlns:a16="http://schemas.microsoft.com/office/drawing/2014/main" id="{4D1A53CC-4C76-4EB3-9971-A83B9C9BA87B}"/>
+              </a:ext>
+            </a:extLst>
+          </p:cNvPr>
+          <p:cNvPicPr>
+            <a:picLocks noChangeAspect="1"/>
+          </p:cNvPicPr>
+          <p:nvPr/>
+        </p:nvPicPr>
+        <p:blipFill>
+          <a:blip r:embed="rId2"/>
+          <a:stretch>
+            <a:fillRect/>
+          </a:stretch>
+        </p:blipFill>
+        <p:spPr>
+          <a:xfrm>
+            <a:off x="10255348" y="0"/>
+            <a:ext cx="1936652" cy="846111"/>
+          </a:xfrm>
+          <a:prstGeom prst="rect">
+            <a:avLst/>
+          </a:prstGeom>
+        </p:spPr>
+      </p:pic>
+      <p:pic>
+        <p:nvPicPr>
+          <p:cNvPr id="6" name="Picture 5" descr="A screenshot of a video game&#10;&#10;Description automatically generated">
+            <a:extLst>
+              <a:ext uri="{FF2B5EF4-FFF2-40B4-BE49-F238E27FC236}">
+                <a16:creationId xmlns:a16="http://schemas.microsoft.com/office/drawing/2014/main" id="{2FEC0F2B-1940-4CB2-B023-56091C2749EB}"/>
+              </a:ext>
+            </a:extLst>
+          </p:cNvPr>
+          <p:cNvPicPr>
+            <a:picLocks noChangeAspect="1"/>
+          </p:cNvPicPr>
+          <p:nvPr/>
+        </p:nvPicPr>
+        <p:blipFill>
+          <a:blip r:embed="rId3">
+            <a:extLst>
+              <a:ext uri="{28A0092B-C50C-407E-A947-70E740481C1C}">
+                <a14:useLocalDpi xmlns:a14="http://schemas.microsoft.com/office/drawing/2010/main" val="0"/>
+              </a:ext>
+            </a:extLst>
+          </a:blip>
+          <a:stretch>
+            <a:fillRect/>
+          </a:stretch>
+        </p:blipFill>
+        <p:spPr>
+          <a:xfrm>
+            <a:off x="1276315" y="1290622"/>
+            <a:ext cx="9639370" cy="4276756"/>
+          </a:xfrm>
+          <a:prstGeom prst="rect">
+            <a:avLst/>
+          </a:prstGeom>
+        </p:spPr>
+      </p:pic>
+    </p:spTree>
+    <p:extLst>
+      <p:ext uri="{BB962C8B-B14F-4D97-AF65-F5344CB8AC3E}">
+        <p14:creationId xmlns:p14="http://schemas.microsoft.com/office/powerpoint/2010/main" val="188225898"/>
+      </p:ext>
+    </p:extLst>
+  </p:cSld>
+  <p:clrMapOvr>
+    <a:masterClrMapping/>
+  </p:clrMapOvr>
+</p:sld>
+</file>
+
+<file path=ppt/slides/slide21.xml><?xml version="1.0" encoding="utf-8"?>
+<p:sld xmlns:a="http://schemas.openxmlformats.org/drawingml/2006/main" xmlns:r="http://schemas.openxmlformats.org/officeDocument/2006/relationships" xmlns:p="http://schemas.openxmlformats.org/presentationml/2006/main">
+  <p:cSld>
+    <p:spTree>
+      <p:nvGrpSpPr>
+        <p:cNvPr id="1" name=""/>
+        <p:cNvGrpSpPr/>
+        <p:nvPr/>
+      </p:nvGrpSpPr>
+      <p:grpSpPr>
+        <a:xfrm>
+          <a:off x="0" y="0"/>
+          <a:ext cx="0" cy="0"/>
+          <a:chOff x="0" y="0"/>
+          <a:chExt cx="0" cy="0"/>
+        </a:xfrm>
+      </p:grpSpPr>
+      <p:sp>
+        <p:nvSpPr>
+          <p:cNvPr id="2" name="Title 1">
+            <a:extLst>
+              <a:ext uri="{FF2B5EF4-FFF2-40B4-BE49-F238E27FC236}">
+                <a16:creationId xmlns:a16="http://schemas.microsoft.com/office/drawing/2014/main" id="{3046C11F-7160-4D6E-B2F8-4AD6752B1B56}"/>
+              </a:ext>
+            </a:extLst>
+          </p:cNvPr>
+          <p:cNvSpPr>
+            <a:spLocks noGrp="1"/>
+          </p:cNvSpPr>
+          <p:nvPr>
+            <p:ph type="title"/>
+          </p:nvPr>
+        </p:nvSpPr>
+        <p:spPr>
+          <a:xfrm>
             <a:off x="838200" y="180204"/>
             <a:ext cx="10515600" cy="770654"/>
           </a:xfrm>
@@ -5725,7 +7223,7 @@
           <a:lstStyle/>
           <a:p>
             <a:r>
-              <a:rPr lang="en-IN" sz="4000" b="1" dirty="0">
+              <a:rPr lang="en-IN" sz="3200" b="1" dirty="0">
                 <a:solidFill>
                   <a:srgbClr val="002060"/>
                 </a:solidFill>
@@ -5814,7 +7312,788 @@
 </p:sld>
 </file>
 
-<file path=ppt/slides/slide21.xml><?xml version="1.0" encoding="utf-8"?>
+<file path=ppt/slides/slide22.xml><?xml version="1.0" encoding="utf-8"?>
+<p:sld xmlns:a="http://schemas.openxmlformats.org/drawingml/2006/main" xmlns:r="http://schemas.openxmlformats.org/officeDocument/2006/relationships" xmlns:p="http://schemas.openxmlformats.org/presentationml/2006/main">
+  <p:cSld>
+    <p:spTree>
+      <p:nvGrpSpPr>
+        <p:cNvPr id="1" name=""/>
+        <p:cNvGrpSpPr/>
+        <p:nvPr/>
+      </p:nvGrpSpPr>
+      <p:grpSpPr>
+        <a:xfrm>
+          <a:off x="0" y="0"/>
+          <a:ext cx="0" cy="0"/>
+          <a:chOff x="0" y="0"/>
+          <a:chExt cx="0" cy="0"/>
+        </a:xfrm>
+      </p:grpSpPr>
+      <p:sp>
+        <p:nvSpPr>
+          <p:cNvPr id="2" name="Title 1">
+            <a:extLst>
+              <a:ext uri="{FF2B5EF4-FFF2-40B4-BE49-F238E27FC236}">
+                <a16:creationId xmlns:a16="http://schemas.microsoft.com/office/drawing/2014/main" id="{3046C11F-7160-4D6E-B2F8-4AD6752B1B56}"/>
+              </a:ext>
+            </a:extLst>
+          </p:cNvPr>
+          <p:cNvSpPr>
+            <a:spLocks noGrp="1"/>
+          </p:cNvSpPr>
+          <p:nvPr>
+            <p:ph type="title"/>
+          </p:nvPr>
+        </p:nvSpPr>
+        <p:spPr>
+          <a:xfrm>
+            <a:off x="838200" y="180204"/>
+            <a:ext cx="10515600" cy="469153"/>
+          </a:xfrm>
+        </p:spPr>
+        <p:txBody>
+          <a:bodyPr>
+            <a:noAutofit/>
+          </a:bodyPr>
+          <a:lstStyle/>
+          <a:p>
+            <a:r>
+              <a:rPr lang="en-IN" sz="3200" b="1" dirty="0">
+                <a:solidFill>
+                  <a:srgbClr val="002060"/>
+                </a:solidFill>
+              </a:rPr>
+              <a:t>Survey Role</a:t>
+            </a:r>
+          </a:p>
+        </p:txBody>
+      </p:sp>
+      <p:pic>
+        <p:nvPicPr>
+          <p:cNvPr id="4" name="Picture 3" descr="A picture containing knife&#10;&#10;Description automatically generated">
+            <a:extLst>
+              <a:ext uri="{FF2B5EF4-FFF2-40B4-BE49-F238E27FC236}">
+                <a16:creationId xmlns:a16="http://schemas.microsoft.com/office/drawing/2014/main" id="{4D1A53CC-4C76-4EB3-9971-A83B9C9BA87B}"/>
+              </a:ext>
+            </a:extLst>
+          </p:cNvPr>
+          <p:cNvPicPr>
+            <a:picLocks noChangeAspect="1"/>
+          </p:cNvPicPr>
+          <p:nvPr/>
+        </p:nvPicPr>
+        <p:blipFill>
+          <a:blip r:embed="rId2"/>
+          <a:stretch>
+            <a:fillRect/>
+          </a:stretch>
+        </p:blipFill>
+        <p:spPr>
+          <a:xfrm>
+            <a:off x="10255348" y="0"/>
+            <a:ext cx="1936652" cy="846111"/>
+          </a:xfrm>
+          <a:prstGeom prst="rect">
+            <a:avLst/>
+          </a:prstGeom>
+        </p:spPr>
+      </p:pic>
+      <p:pic>
+        <p:nvPicPr>
+          <p:cNvPr id="5" name="Picture 4" descr="A picture containing screenshot&#10;&#10;Description automatically generated">
+            <a:extLst>
+              <a:ext uri="{FF2B5EF4-FFF2-40B4-BE49-F238E27FC236}">
+                <a16:creationId xmlns:a16="http://schemas.microsoft.com/office/drawing/2014/main" id="{0AEAEB04-A0D4-433B-961F-E32FAD312886}"/>
+              </a:ext>
+            </a:extLst>
+          </p:cNvPr>
+          <p:cNvPicPr>
+            <a:picLocks noChangeAspect="1"/>
+          </p:cNvPicPr>
+          <p:nvPr/>
+        </p:nvPicPr>
+        <p:blipFill>
+          <a:blip r:embed="rId3">
+            <a:extLst>
+              <a:ext uri="{28A0092B-C50C-407E-A947-70E740481C1C}">
+                <a14:useLocalDpi xmlns:a14="http://schemas.microsoft.com/office/drawing/2010/main" val="0"/>
+              </a:ext>
+            </a:extLst>
+          </a:blip>
+          <a:stretch>
+            <a:fillRect/>
+          </a:stretch>
+        </p:blipFill>
+        <p:spPr>
+          <a:xfrm>
+            <a:off x="2474092" y="1281097"/>
+            <a:ext cx="7243815" cy="4295806"/>
+          </a:xfrm>
+          <a:prstGeom prst="rect">
+            <a:avLst/>
+          </a:prstGeom>
+        </p:spPr>
+      </p:pic>
+    </p:spTree>
+    <p:extLst>
+      <p:ext uri="{BB962C8B-B14F-4D97-AF65-F5344CB8AC3E}">
+        <p14:creationId xmlns:p14="http://schemas.microsoft.com/office/powerpoint/2010/main" val="4282175950"/>
+      </p:ext>
+    </p:extLst>
+  </p:cSld>
+  <p:clrMapOvr>
+    <a:masterClrMapping/>
+  </p:clrMapOvr>
+</p:sld>
+</file>
+
+<file path=ppt/slides/slide23.xml><?xml version="1.0" encoding="utf-8"?>
+<p:sld xmlns:a="http://schemas.openxmlformats.org/drawingml/2006/main" xmlns:r="http://schemas.openxmlformats.org/officeDocument/2006/relationships" xmlns:p="http://schemas.openxmlformats.org/presentationml/2006/main">
+  <p:cSld>
+    <p:spTree>
+      <p:nvGrpSpPr>
+        <p:cNvPr id="1" name=""/>
+        <p:cNvGrpSpPr/>
+        <p:nvPr/>
+      </p:nvGrpSpPr>
+      <p:grpSpPr>
+        <a:xfrm>
+          <a:off x="0" y="0"/>
+          <a:ext cx="0" cy="0"/>
+          <a:chOff x="0" y="0"/>
+          <a:chExt cx="0" cy="0"/>
+        </a:xfrm>
+      </p:grpSpPr>
+      <p:sp>
+        <p:nvSpPr>
+          <p:cNvPr id="2" name="Title 1">
+            <a:extLst>
+              <a:ext uri="{FF2B5EF4-FFF2-40B4-BE49-F238E27FC236}">
+                <a16:creationId xmlns:a16="http://schemas.microsoft.com/office/drawing/2014/main" id="{3046C11F-7160-4D6E-B2F8-4AD6752B1B56}"/>
+              </a:ext>
+            </a:extLst>
+          </p:cNvPr>
+          <p:cNvSpPr>
+            <a:spLocks noGrp="1"/>
+          </p:cNvSpPr>
+          <p:nvPr>
+            <p:ph type="title"/>
+          </p:nvPr>
+        </p:nvSpPr>
+        <p:spPr>
+          <a:xfrm>
+            <a:off x="838200" y="180204"/>
+            <a:ext cx="10515600" cy="561918"/>
+          </a:xfrm>
+        </p:spPr>
+        <p:txBody>
+          <a:bodyPr>
+            <a:normAutofit/>
+          </a:bodyPr>
+          <a:lstStyle/>
+          <a:p>
+            <a:r>
+              <a:rPr lang="en-IN" sz="3200" b="1" dirty="0">
+                <a:solidFill>
+                  <a:srgbClr val="002060"/>
+                </a:solidFill>
+              </a:rPr>
+              <a:t>Detect Role</a:t>
+            </a:r>
+          </a:p>
+        </p:txBody>
+      </p:sp>
+      <p:pic>
+        <p:nvPicPr>
+          <p:cNvPr id="4" name="Picture 3" descr="A picture containing knife&#10;&#10;Description automatically generated">
+            <a:extLst>
+              <a:ext uri="{FF2B5EF4-FFF2-40B4-BE49-F238E27FC236}">
+                <a16:creationId xmlns:a16="http://schemas.microsoft.com/office/drawing/2014/main" id="{4D1A53CC-4C76-4EB3-9971-A83B9C9BA87B}"/>
+              </a:ext>
+            </a:extLst>
+          </p:cNvPr>
+          <p:cNvPicPr>
+            <a:picLocks noChangeAspect="1"/>
+          </p:cNvPicPr>
+          <p:nvPr/>
+        </p:nvPicPr>
+        <p:blipFill>
+          <a:blip r:embed="rId2"/>
+          <a:stretch>
+            <a:fillRect/>
+          </a:stretch>
+        </p:blipFill>
+        <p:spPr>
+          <a:xfrm>
+            <a:off x="10255348" y="0"/>
+            <a:ext cx="1936652" cy="846111"/>
+          </a:xfrm>
+          <a:prstGeom prst="rect">
+            <a:avLst/>
+          </a:prstGeom>
+        </p:spPr>
+      </p:pic>
+      <p:pic>
+        <p:nvPicPr>
+          <p:cNvPr id="5" name="Picture 4" descr="A picture containing screenshot&#10;&#10;Description automatically generated">
+            <a:extLst>
+              <a:ext uri="{FF2B5EF4-FFF2-40B4-BE49-F238E27FC236}">
+                <a16:creationId xmlns:a16="http://schemas.microsoft.com/office/drawing/2014/main" id="{B7635EAF-3B39-4DFE-A5A4-0C6E79A1140D}"/>
+              </a:ext>
+            </a:extLst>
+          </p:cNvPr>
+          <p:cNvPicPr>
+            <a:picLocks noChangeAspect="1"/>
+          </p:cNvPicPr>
+          <p:nvPr/>
+        </p:nvPicPr>
+        <p:blipFill>
+          <a:blip r:embed="rId3">
+            <a:extLst>
+              <a:ext uri="{28A0092B-C50C-407E-A947-70E740481C1C}">
+                <a14:useLocalDpi xmlns:a14="http://schemas.microsoft.com/office/drawing/2010/main" val="0"/>
+              </a:ext>
+            </a:extLst>
+          </a:blip>
+          <a:stretch>
+            <a:fillRect/>
+          </a:stretch>
+        </p:blipFill>
+        <p:spPr>
+          <a:xfrm>
+            <a:off x="2393606" y="1026315"/>
+            <a:ext cx="8283771" cy="5565484"/>
+          </a:xfrm>
+          <a:prstGeom prst="rect">
+            <a:avLst/>
+          </a:prstGeom>
+        </p:spPr>
+      </p:pic>
+    </p:spTree>
+    <p:extLst>
+      <p:ext uri="{BB962C8B-B14F-4D97-AF65-F5344CB8AC3E}">
+        <p14:creationId xmlns:p14="http://schemas.microsoft.com/office/powerpoint/2010/main" val="933190703"/>
+      </p:ext>
+    </p:extLst>
+  </p:cSld>
+  <p:clrMapOvr>
+    <a:masterClrMapping/>
+  </p:clrMapOvr>
+</p:sld>
+</file>
+
+<file path=ppt/slides/slide24.xml><?xml version="1.0" encoding="utf-8"?>
+<p:sld xmlns:a="http://schemas.openxmlformats.org/drawingml/2006/main" xmlns:r="http://schemas.openxmlformats.org/officeDocument/2006/relationships" xmlns:p="http://schemas.openxmlformats.org/presentationml/2006/main">
+  <p:cSld>
+    <p:spTree>
+      <p:nvGrpSpPr>
+        <p:cNvPr id="1" name=""/>
+        <p:cNvGrpSpPr/>
+        <p:nvPr/>
+      </p:nvGrpSpPr>
+      <p:grpSpPr>
+        <a:xfrm>
+          <a:off x="0" y="0"/>
+          <a:ext cx="0" cy="0"/>
+          <a:chOff x="0" y="0"/>
+          <a:chExt cx="0" cy="0"/>
+        </a:xfrm>
+      </p:grpSpPr>
+      <p:sp>
+        <p:nvSpPr>
+          <p:cNvPr id="2" name="Title 1">
+            <a:extLst>
+              <a:ext uri="{FF2B5EF4-FFF2-40B4-BE49-F238E27FC236}">
+                <a16:creationId xmlns:a16="http://schemas.microsoft.com/office/drawing/2014/main" id="{3046C11F-7160-4D6E-B2F8-4AD6752B1B56}"/>
+              </a:ext>
+            </a:extLst>
+          </p:cNvPr>
+          <p:cNvSpPr>
+            <a:spLocks noGrp="1"/>
+          </p:cNvSpPr>
+          <p:nvPr>
+            <p:ph type="title"/>
+          </p:nvPr>
+        </p:nvSpPr>
+        <p:spPr>
+          <a:xfrm>
+            <a:off x="838200" y="180204"/>
+            <a:ext cx="10515600" cy="770654"/>
+          </a:xfrm>
+        </p:spPr>
+        <p:txBody>
+          <a:bodyPr>
+            <a:normAutofit/>
+          </a:bodyPr>
+          <a:lstStyle/>
+          <a:p>
+            <a:r>
+              <a:rPr lang="en-IN" sz="3200" b="1" dirty="0">
+                <a:solidFill>
+                  <a:srgbClr val="002060"/>
+                </a:solidFill>
+              </a:rPr>
+              <a:t>Survey and Detect Role Sequence Diagram</a:t>
+            </a:r>
+          </a:p>
+        </p:txBody>
+      </p:sp>
+      <p:pic>
+        <p:nvPicPr>
+          <p:cNvPr id="4" name="Picture 3" descr="A picture containing knife&#10;&#10;Description automatically generated">
+            <a:extLst>
+              <a:ext uri="{FF2B5EF4-FFF2-40B4-BE49-F238E27FC236}">
+                <a16:creationId xmlns:a16="http://schemas.microsoft.com/office/drawing/2014/main" id="{4D1A53CC-4C76-4EB3-9971-A83B9C9BA87B}"/>
+              </a:ext>
+            </a:extLst>
+          </p:cNvPr>
+          <p:cNvPicPr>
+            <a:picLocks noChangeAspect="1"/>
+          </p:cNvPicPr>
+          <p:nvPr/>
+        </p:nvPicPr>
+        <p:blipFill>
+          <a:blip r:embed="rId2"/>
+          <a:stretch>
+            <a:fillRect/>
+          </a:stretch>
+        </p:blipFill>
+        <p:spPr>
+          <a:xfrm>
+            <a:off x="10255348" y="0"/>
+            <a:ext cx="1936652" cy="846111"/>
+          </a:xfrm>
+          <a:prstGeom prst="rect">
+            <a:avLst/>
+          </a:prstGeom>
+        </p:spPr>
+      </p:pic>
+      <p:pic>
+        <p:nvPicPr>
+          <p:cNvPr id="11" name="Picture 10" descr="A screenshot of a social media post&#10;&#10;Description automatically generated">
+            <a:extLst>
+              <a:ext uri="{FF2B5EF4-FFF2-40B4-BE49-F238E27FC236}">
+                <a16:creationId xmlns:a16="http://schemas.microsoft.com/office/drawing/2014/main" id="{4C3AC083-7736-4BF1-8302-8DEDBC474040}"/>
+              </a:ext>
+            </a:extLst>
+          </p:cNvPr>
+          <p:cNvPicPr>
+            <a:picLocks noChangeAspect="1"/>
+          </p:cNvPicPr>
+          <p:nvPr/>
+        </p:nvPicPr>
+        <p:blipFill>
+          <a:blip r:embed="rId3">
+            <a:extLst>
+              <a:ext uri="{28A0092B-C50C-407E-A947-70E740481C1C}">
+                <a14:useLocalDpi xmlns:a14="http://schemas.microsoft.com/office/drawing/2010/main" val="0"/>
+              </a:ext>
+            </a:extLst>
+          </a:blip>
+          <a:stretch>
+            <a:fillRect/>
+          </a:stretch>
+        </p:blipFill>
+        <p:spPr>
+          <a:xfrm>
+            <a:off x="1855085" y="846110"/>
+            <a:ext cx="8481829" cy="6011889"/>
+          </a:xfrm>
+          <a:prstGeom prst="rect">
+            <a:avLst/>
+          </a:prstGeom>
+        </p:spPr>
+      </p:pic>
+    </p:spTree>
+    <p:extLst>
+      <p:ext uri="{BB962C8B-B14F-4D97-AF65-F5344CB8AC3E}">
+        <p14:creationId xmlns:p14="http://schemas.microsoft.com/office/powerpoint/2010/main" val="2580652182"/>
+      </p:ext>
+    </p:extLst>
+  </p:cSld>
+  <p:clrMapOvr>
+    <a:masterClrMapping/>
+  </p:clrMapOvr>
+</p:sld>
+</file>
+
+<file path=ppt/slides/slide25.xml><?xml version="1.0" encoding="utf-8"?>
+<p:sld xmlns:a="http://schemas.openxmlformats.org/drawingml/2006/main" xmlns:r="http://schemas.openxmlformats.org/officeDocument/2006/relationships" xmlns:p="http://schemas.openxmlformats.org/presentationml/2006/main">
+  <p:cSld>
+    <p:spTree>
+      <p:nvGrpSpPr>
+        <p:cNvPr id="1" name=""/>
+        <p:cNvGrpSpPr/>
+        <p:nvPr/>
+      </p:nvGrpSpPr>
+      <p:grpSpPr>
+        <a:xfrm>
+          <a:off x="0" y="0"/>
+          <a:ext cx="0" cy="0"/>
+          <a:chOff x="0" y="0"/>
+          <a:chExt cx="0" cy="0"/>
+        </a:xfrm>
+      </p:grpSpPr>
+      <p:sp>
+        <p:nvSpPr>
+          <p:cNvPr id="2" name="Title 1">
+            <a:extLst>
+              <a:ext uri="{FF2B5EF4-FFF2-40B4-BE49-F238E27FC236}">
+                <a16:creationId xmlns:a16="http://schemas.microsoft.com/office/drawing/2014/main" id="{3046C11F-7160-4D6E-B2F8-4AD6752B1B56}"/>
+              </a:ext>
+            </a:extLst>
+          </p:cNvPr>
+          <p:cNvSpPr>
+            <a:spLocks noGrp="1"/>
+          </p:cNvSpPr>
+          <p:nvPr>
+            <p:ph type="title"/>
+          </p:nvPr>
+        </p:nvSpPr>
+        <p:spPr>
+          <a:xfrm>
+            <a:off x="838200" y="180204"/>
+            <a:ext cx="10515600" cy="770654"/>
+          </a:xfrm>
+        </p:spPr>
+        <p:txBody>
+          <a:bodyPr>
+            <a:normAutofit/>
+          </a:bodyPr>
+          <a:lstStyle/>
+          <a:p>
+            <a:r>
+              <a:rPr lang="en-IN" sz="3200" b="1" dirty="0">
+                <a:solidFill>
+                  <a:srgbClr val="002060"/>
+                </a:solidFill>
+              </a:rPr>
+              <a:t>Survey and Detect Role Real-time State Chart</a:t>
+            </a:r>
+          </a:p>
+        </p:txBody>
+      </p:sp>
+      <p:pic>
+        <p:nvPicPr>
+          <p:cNvPr id="4" name="Picture 3" descr="A picture containing knife&#10;&#10;Description automatically generated">
+            <a:extLst>
+              <a:ext uri="{FF2B5EF4-FFF2-40B4-BE49-F238E27FC236}">
+                <a16:creationId xmlns:a16="http://schemas.microsoft.com/office/drawing/2014/main" id="{4D1A53CC-4C76-4EB3-9971-A83B9C9BA87B}"/>
+              </a:ext>
+            </a:extLst>
+          </p:cNvPr>
+          <p:cNvPicPr>
+            <a:picLocks noChangeAspect="1"/>
+          </p:cNvPicPr>
+          <p:nvPr/>
+        </p:nvPicPr>
+        <p:blipFill>
+          <a:blip r:embed="rId2"/>
+          <a:stretch>
+            <a:fillRect/>
+          </a:stretch>
+        </p:blipFill>
+        <p:spPr>
+          <a:xfrm>
+            <a:off x="10255348" y="0"/>
+            <a:ext cx="1936652" cy="846111"/>
+          </a:xfrm>
+          <a:prstGeom prst="rect">
+            <a:avLst/>
+          </a:prstGeom>
+        </p:spPr>
+      </p:pic>
+      <p:pic>
+        <p:nvPicPr>
+          <p:cNvPr id="5" name="Picture 4" descr="A screenshot of a social media post&#10;&#10;Description automatically generated">
+            <a:extLst>
+              <a:ext uri="{FF2B5EF4-FFF2-40B4-BE49-F238E27FC236}">
+                <a16:creationId xmlns:a16="http://schemas.microsoft.com/office/drawing/2014/main" id="{017AE137-819E-42DC-8FE6-9EA1F2355C65}"/>
+              </a:ext>
+            </a:extLst>
+          </p:cNvPr>
+          <p:cNvPicPr>
+            <a:picLocks noChangeAspect="1"/>
+          </p:cNvPicPr>
+          <p:nvPr/>
+        </p:nvPicPr>
+        <p:blipFill>
+          <a:blip r:embed="rId3">
+            <a:extLst>
+              <a:ext uri="{28A0092B-C50C-407E-A947-70E740481C1C}">
+                <a14:useLocalDpi xmlns:a14="http://schemas.microsoft.com/office/drawing/2010/main" val="0"/>
+              </a:ext>
+            </a:extLst>
+          </a:blip>
+          <a:stretch>
+            <a:fillRect/>
+          </a:stretch>
+        </p:blipFill>
+        <p:spPr>
+          <a:xfrm>
+            <a:off x="5800466" y="1426450"/>
+            <a:ext cx="6391534" cy="3682994"/>
+          </a:xfrm>
+          <a:prstGeom prst="rect">
+            <a:avLst/>
+          </a:prstGeom>
+        </p:spPr>
+      </p:pic>
+      <p:pic>
+        <p:nvPicPr>
+          <p:cNvPr id="6" name="Picture 5" descr="A close up of a map&#10;&#10;Description automatically generated">
+            <a:extLst>
+              <a:ext uri="{FF2B5EF4-FFF2-40B4-BE49-F238E27FC236}">
+                <a16:creationId xmlns:a16="http://schemas.microsoft.com/office/drawing/2014/main" id="{52A8429C-FA9A-415D-8B83-215E2375FE4A}"/>
+              </a:ext>
+            </a:extLst>
+          </p:cNvPr>
+          <p:cNvPicPr>
+            <a:picLocks noChangeAspect="1"/>
+          </p:cNvPicPr>
+          <p:nvPr/>
+        </p:nvPicPr>
+        <p:blipFill>
+          <a:blip r:embed="rId4">
+            <a:extLst>
+              <a:ext uri="{28A0092B-C50C-407E-A947-70E740481C1C}">
+                <a14:useLocalDpi xmlns:a14="http://schemas.microsoft.com/office/drawing/2010/main" val="0"/>
+              </a:ext>
+            </a:extLst>
+          </a:blip>
+          <a:stretch>
+            <a:fillRect/>
+          </a:stretch>
+        </p:blipFill>
+        <p:spPr>
+          <a:xfrm>
+            <a:off x="0" y="1131062"/>
+            <a:ext cx="6182830" cy="3798178"/>
+          </a:xfrm>
+          <a:prstGeom prst="rect">
+            <a:avLst/>
+          </a:prstGeom>
+        </p:spPr>
+      </p:pic>
+      <p:sp>
+        <p:nvSpPr>
+          <p:cNvPr id="7" name="TextBox 6">
+            <a:extLst>
+              <a:ext uri="{FF2B5EF4-FFF2-40B4-BE49-F238E27FC236}">
+                <a16:creationId xmlns:a16="http://schemas.microsoft.com/office/drawing/2014/main" id="{55C6D1A4-9A16-4D72-9A30-E1B183C8E7A8}"/>
+              </a:ext>
+            </a:extLst>
+          </p:cNvPr>
+          <p:cNvSpPr txBox="1"/>
+          <p:nvPr/>
+        </p:nvSpPr>
+        <p:spPr>
+          <a:xfrm>
+            <a:off x="2054087" y="5321051"/>
+            <a:ext cx="1538947" cy="369332"/>
+          </a:xfrm>
+          <a:prstGeom prst="rect">
+            <a:avLst/>
+          </a:prstGeom>
+          <a:noFill/>
+        </p:spPr>
+        <p:txBody>
+          <a:bodyPr wrap="none" rtlCol="0">
+            <a:spAutoFit/>
+          </a:bodyPr>
+          <a:lstStyle/>
+          <a:p>
+            <a:r>
+              <a:rPr lang="en-IN" b="1" dirty="0"/>
+              <a:t>SURVEY ROLE</a:t>
+            </a:r>
+          </a:p>
+        </p:txBody>
+      </p:sp>
+      <p:sp>
+        <p:nvSpPr>
+          <p:cNvPr id="8" name="TextBox 7">
+            <a:extLst>
+              <a:ext uri="{FF2B5EF4-FFF2-40B4-BE49-F238E27FC236}">
+                <a16:creationId xmlns:a16="http://schemas.microsoft.com/office/drawing/2014/main" id="{3C8C7766-C479-4A0D-B16D-60BC64663DCF}"/>
+              </a:ext>
+            </a:extLst>
+          </p:cNvPr>
+          <p:cNvSpPr txBox="1"/>
+          <p:nvPr/>
+        </p:nvSpPr>
+        <p:spPr>
+          <a:xfrm>
+            <a:off x="8263628" y="5314128"/>
+            <a:ext cx="1448153" cy="369332"/>
+          </a:xfrm>
+          <a:prstGeom prst="rect">
+            <a:avLst/>
+          </a:prstGeom>
+          <a:noFill/>
+        </p:spPr>
+        <p:txBody>
+          <a:bodyPr wrap="none" rtlCol="0">
+            <a:spAutoFit/>
+          </a:bodyPr>
+          <a:lstStyle/>
+          <a:p>
+            <a:r>
+              <a:rPr lang="en-IN" b="1" dirty="0"/>
+              <a:t>DETECT ROLE</a:t>
+            </a:r>
+          </a:p>
+        </p:txBody>
+      </p:sp>
+    </p:spTree>
+    <p:extLst>
+      <p:ext uri="{BB962C8B-B14F-4D97-AF65-F5344CB8AC3E}">
+        <p14:creationId xmlns:p14="http://schemas.microsoft.com/office/powerpoint/2010/main" val="3770120600"/>
+      </p:ext>
+    </p:extLst>
+  </p:cSld>
+  <p:clrMapOvr>
+    <a:masterClrMapping/>
+  </p:clrMapOvr>
+</p:sld>
+</file>
+
+<file path=ppt/slides/slide26.xml><?xml version="1.0" encoding="utf-8"?>
+<p:sld xmlns:a="http://schemas.openxmlformats.org/drawingml/2006/main" xmlns:r="http://schemas.openxmlformats.org/officeDocument/2006/relationships" xmlns:p="http://schemas.openxmlformats.org/presentationml/2006/main">
+  <p:cSld>
+    <p:spTree>
+      <p:nvGrpSpPr>
+        <p:cNvPr id="1" name=""/>
+        <p:cNvGrpSpPr/>
+        <p:nvPr/>
+      </p:nvGrpSpPr>
+      <p:grpSpPr>
+        <a:xfrm>
+          <a:off x="0" y="0"/>
+          <a:ext cx="0" cy="0"/>
+          <a:chOff x="0" y="0"/>
+          <a:chExt cx="0" cy="0"/>
+        </a:xfrm>
+      </p:grpSpPr>
+      <p:sp>
+        <p:nvSpPr>
+          <p:cNvPr id="2" name="Title 1">
+            <a:extLst>
+              <a:ext uri="{FF2B5EF4-FFF2-40B4-BE49-F238E27FC236}">
+                <a16:creationId xmlns:a16="http://schemas.microsoft.com/office/drawing/2014/main" id="{3046C11F-7160-4D6E-B2F8-4AD6752B1B56}"/>
+              </a:ext>
+            </a:extLst>
+          </p:cNvPr>
+          <p:cNvSpPr>
+            <a:spLocks noGrp="1"/>
+          </p:cNvSpPr>
+          <p:nvPr>
+            <p:ph type="title"/>
+          </p:nvPr>
+        </p:nvSpPr>
+        <p:spPr>
+          <a:xfrm>
+            <a:off x="838200" y="180204"/>
+            <a:ext cx="10515600" cy="770654"/>
+          </a:xfrm>
+        </p:spPr>
+        <p:txBody>
+          <a:bodyPr>
+            <a:normAutofit/>
+          </a:bodyPr>
+          <a:lstStyle/>
+          <a:p>
+            <a:r>
+              <a:rPr lang="en-IN" sz="3200" b="1" dirty="0">
+                <a:solidFill>
+                  <a:srgbClr val="002060"/>
+                </a:solidFill>
+              </a:rPr>
+              <a:t>Rescue Scenario</a:t>
+            </a:r>
+          </a:p>
+        </p:txBody>
+      </p:sp>
+      <p:pic>
+        <p:nvPicPr>
+          <p:cNvPr id="4" name="Picture 3" descr="A picture containing knife&#10;&#10;Description automatically generated">
+            <a:extLst>
+              <a:ext uri="{FF2B5EF4-FFF2-40B4-BE49-F238E27FC236}">
+                <a16:creationId xmlns:a16="http://schemas.microsoft.com/office/drawing/2014/main" id="{4D1A53CC-4C76-4EB3-9971-A83B9C9BA87B}"/>
+              </a:ext>
+            </a:extLst>
+          </p:cNvPr>
+          <p:cNvPicPr>
+            <a:picLocks noChangeAspect="1"/>
+          </p:cNvPicPr>
+          <p:nvPr/>
+        </p:nvPicPr>
+        <p:blipFill>
+          <a:blip r:embed="rId2"/>
+          <a:stretch>
+            <a:fillRect/>
+          </a:stretch>
+        </p:blipFill>
+        <p:spPr>
+          <a:xfrm>
+            <a:off x="10255348" y="0"/>
+            <a:ext cx="1936652" cy="846111"/>
+          </a:xfrm>
+          <a:prstGeom prst="rect">
+            <a:avLst/>
+          </a:prstGeom>
+        </p:spPr>
+      </p:pic>
+      <p:pic>
+        <p:nvPicPr>
+          <p:cNvPr id="6" name="Picture 5" descr="A screenshot of a cell phone&#10;&#10;Description automatically generated">
+            <a:extLst>
+              <a:ext uri="{FF2B5EF4-FFF2-40B4-BE49-F238E27FC236}">
+                <a16:creationId xmlns:a16="http://schemas.microsoft.com/office/drawing/2014/main" id="{A0190034-3A4D-4819-A744-D82F0CC87B14}"/>
+              </a:ext>
+            </a:extLst>
+          </p:cNvPr>
+          <p:cNvPicPr>
+            <a:picLocks noChangeAspect="1"/>
+          </p:cNvPicPr>
+          <p:nvPr/>
+        </p:nvPicPr>
+        <p:blipFill>
+          <a:blip r:embed="rId3">
+            <a:extLst>
+              <a:ext uri="{28A0092B-C50C-407E-A947-70E740481C1C}">
+                <a14:useLocalDpi xmlns:a14="http://schemas.microsoft.com/office/drawing/2010/main" val="0"/>
+              </a:ext>
+            </a:extLst>
+          </a:blip>
+          <a:stretch>
+            <a:fillRect/>
+          </a:stretch>
+        </p:blipFill>
+        <p:spPr>
+          <a:xfrm>
+            <a:off x="1197752" y="1230173"/>
+            <a:ext cx="9796495" cy="5201497"/>
+          </a:xfrm>
+          <a:prstGeom prst="rect">
+            <a:avLst/>
+          </a:prstGeom>
+        </p:spPr>
+      </p:pic>
+    </p:spTree>
+    <p:extLst>
+      <p:ext uri="{BB962C8B-B14F-4D97-AF65-F5344CB8AC3E}">
+        <p14:creationId xmlns:p14="http://schemas.microsoft.com/office/powerpoint/2010/main" val="322969460"/>
+      </p:ext>
+    </p:extLst>
+  </p:cSld>
+  <p:clrMapOvr>
+    <a:masterClrMapping/>
+  </p:clrMapOvr>
+</p:sld>
+</file>
+
+<file path=ppt/slides/slide27.xml><?xml version="1.0" encoding="utf-8"?>
 <p:sld xmlns:a="http://schemas.openxmlformats.org/drawingml/2006/main" xmlns:r="http://schemas.openxmlformats.org/officeDocument/2006/relationships" xmlns:p="http://schemas.openxmlformats.org/presentationml/2006/main">
   <p:cSld>
     <p:bg>
@@ -5895,7 +8174,7 @@
           <a:lstStyle/>
           <a:p>
             <a:pPr algn="ctr"/>
-            <a:endParaRPr lang="en-US"/>
+            <a:endParaRPr lang="en-US" dirty="0"/>
           </a:p>
         </p:txBody>
       </p:sp>
@@ -5988,7 +8267,7 @@
 </p:sld>
 </file>
 
-<file path=ppt/slides/slide22.xml><?xml version="1.0" encoding="utf-8"?>
+<file path=ppt/slides/slide28.xml><?xml version="1.0" encoding="utf-8"?>
 <p:sld xmlns:a="http://schemas.openxmlformats.org/drawingml/2006/main" xmlns:r="http://schemas.openxmlformats.org/officeDocument/2006/relationships" xmlns:p="http://schemas.openxmlformats.org/presentationml/2006/main">
   <p:cSld>
     <p:bg>
@@ -6069,7 +8348,7 @@
           <a:lstStyle/>
           <a:p>
             <a:pPr algn="ctr"/>
-            <a:endParaRPr lang="en-US"/>
+            <a:endParaRPr lang="en-US" dirty="0"/>
           </a:p>
         </p:txBody>
       </p:sp>
@@ -6159,7 +8438,7 @@
         <p:spPr>
           <a:xfrm>
             <a:off x="838200" y="249262"/>
-            <a:ext cx="10515600" cy="846112"/>
+            <a:ext cx="10515600" cy="596849"/>
           </a:xfrm>
         </p:spPr>
         <p:txBody>
@@ -6169,7 +8448,7 @@
           <a:lstStyle/>
           <a:p>
             <a:r>
-              <a:rPr lang="en-IN" sz="4000" b="1" dirty="0">
+              <a:rPr lang="en-IN" sz="3200" b="1" dirty="0">
                 <a:solidFill>
                   <a:srgbClr val="002060"/>
                 </a:solidFill>
@@ -6293,17 +8572,17 @@
         <p:spPr>
           <a:xfrm>
             <a:off x="838200" y="159115"/>
-            <a:ext cx="10515600" cy="770654"/>
+            <a:ext cx="10515600" cy="503494"/>
           </a:xfrm>
         </p:spPr>
         <p:txBody>
           <a:bodyPr>
-            <a:normAutofit/>
+            <a:normAutofit fontScale="90000"/>
           </a:bodyPr>
           <a:lstStyle/>
           <a:p>
             <a:r>
-              <a:rPr lang="en-IN" sz="4000" b="1" dirty="0">
+              <a:rPr lang="en-IN" sz="3200" b="1" dirty="0">
                 <a:solidFill>
                   <a:srgbClr val="002060"/>
                 </a:solidFill>
@@ -6562,17 +8841,17 @@
         <p:spPr>
           <a:xfrm>
             <a:off x="838200" y="214699"/>
-            <a:ext cx="10515600" cy="770654"/>
+            <a:ext cx="10515600" cy="500918"/>
           </a:xfrm>
         </p:spPr>
         <p:txBody>
           <a:bodyPr>
-            <a:normAutofit/>
+            <a:normAutofit fontScale="90000"/>
           </a:bodyPr>
           <a:lstStyle/>
           <a:p>
             <a:r>
-              <a:rPr lang="en-IN" sz="4000" b="1" dirty="0">
+              <a:rPr lang="en-IN" sz="3200" b="1" dirty="0">
                 <a:solidFill>
                   <a:srgbClr val="002060"/>
                 </a:solidFill>
@@ -6839,17 +9118,17 @@
         <p:spPr>
           <a:xfrm>
             <a:off x="838200" y="220292"/>
-            <a:ext cx="10515600" cy="770654"/>
+            <a:ext cx="10515600" cy="429065"/>
           </a:xfrm>
         </p:spPr>
         <p:txBody>
           <a:bodyPr>
-            <a:normAutofit/>
+            <a:normAutofit fontScale="90000"/>
           </a:bodyPr>
           <a:lstStyle/>
           <a:p>
             <a:r>
-              <a:rPr lang="en-IN" sz="4000" b="1" dirty="0">
+              <a:rPr lang="en-IN" sz="3200" b="1" dirty="0">
                 <a:solidFill>
                   <a:srgbClr val="002060"/>
                 </a:solidFill>
@@ -7108,17 +9387,17 @@
         <p:spPr>
           <a:xfrm>
             <a:off x="838200" y="206100"/>
-            <a:ext cx="10515600" cy="770654"/>
+            <a:ext cx="10515600" cy="509517"/>
           </a:xfrm>
         </p:spPr>
         <p:txBody>
           <a:bodyPr>
-            <a:normAutofit/>
+            <a:normAutofit fontScale="90000"/>
           </a:bodyPr>
           <a:lstStyle/>
           <a:p>
             <a:r>
-              <a:rPr lang="en-IN" sz="4000" b="1" dirty="0">
+              <a:rPr lang="en-IN" sz="3200" b="1" dirty="0">
                 <a:solidFill>
                   <a:srgbClr val="002060"/>
                 </a:solidFill>
@@ -7158,10 +9437,46 @@
           </a:prstGeom>
         </p:spPr>
       </p:pic>
+      <p:pic>
+        <p:nvPicPr>
+          <p:cNvPr id="5" name="Picture 4" descr="A screenshot of a cell phone&#10;&#10;Description automatically generated">
+            <a:extLst>
+              <a:ext uri="{FF2B5EF4-FFF2-40B4-BE49-F238E27FC236}">
+                <a16:creationId xmlns:a16="http://schemas.microsoft.com/office/drawing/2014/main" id="{2D0676DF-E047-4442-A83B-94869A403AD2}"/>
+              </a:ext>
+            </a:extLst>
+          </p:cNvPr>
+          <p:cNvPicPr>
+            <a:picLocks noChangeAspect="1"/>
+          </p:cNvPicPr>
+          <p:nvPr/>
+        </p:nvPicPr>
+        <p:blipFill>
+          <a:blip r:embed="rId3">
+            <a:extLst>
+              <a:ext uri="{28A0092B-C50C-407E-A947-70E740481C1C}">
+                <a14:useLocalDpi xmlns:a14="http://schemas.microsoft.com/office/drawing/2010/main" val="0"/>
+              </a:ext>
+            </a:extLst>
+          </a:blip>
+          <a:stretch>
+            <a:fillRect/>
+          </a:stretch>
+        </p:blipFill>
+        <p:spPr>
+          <a:xfrm>
+            <a:off x="0" y="1052211"/>
+            <a:ext cx="12192000" cy="5106531"/>
+          </a:xfrm>
+          <a:prstGeom prst="rect">
+            <a:avLst/>
+          </a:prstGeom>
+        </p:spPr>
+      </p:pic>
     </p:spTree>
     <p:extLst>
       <p:ext uri="{BB962C8B-B14F-4D97-AF65-F5344CB8AC3E}">
-        <p14:creationId xmlns:p14="http://schemas.microsoft.com/office/powerpoint/2010/main" val="1003855262"/>
+        <p14:creationId xmlns:p14="http://schemas.microsoft.com/office/powerpoint/2010/main" val="3571135428"/>
       </p:ext>
     </p:extLst>
   </p:cSld>
@@ -7206,23 +9521,23 @@
         </p:nvSpPr>
         <p:spPr>
           <a:xfrm>
-            <a:off x="838200" y="192848"/>
-            <a:ext cx="10515600" cy="770654"/>
+            <a:off x="838200" y="206100"/>
+            <a:ext cx="10515600" cy="509517"/>
           </a:xfrm>
         </p:spPr>
         <p:txBody>
           <a:bodyPr>
-            <a:normAutofit/>
+            <a:normAutofit fontScale="90000"/>
           </a:bodyPr>
           <a:lstStyle/>
           <a:p>
             <a:r>
-              <a:rPr lang="en-IN" sz="4000" b="1" dirty="0">
+              <a:rPr lang="en-IN" sz="3200" b="1" dirty="0">
                 <a:solidFill>
                   <a:srgbClr val="002060"/>
                 </a:solidFill>
               </a:rPr>
-              <a:t>Functional Model</a:t>
+              <a:t>Requirements Model</a:t>
             </a:r>
           </a:p>
         </p:txBody>
@@ -7257,10 +9572,46 @@
           </a:prstGeom>
         </p:spPr>
       </p:pic>
+      <p:pic>
+        <p:nvPicPr>
+          <p:cNvPr id="6" name="Picture 5" descr="A screenshot of a cell phone&#10;&#10;Description automatically generated">
+            <a:extLst>
+              <a:ext uri="{FF2B5EF4-FFF2-40B4-BE49-F238E27FC236}">
+                <a16:creationId xmlns:a16="http://schemas.microsoft.com/office/drawing/2014/main" id="{16A645DF-1411-4FFB-AE20-4264ACB4E7FA}"/>
+              </a:ext>
+            </a:extLst>
+          </p:cNvPr>
+          <p:cNvPicPr>
+            <a:picLocks noChangeAspect="1"/>
+          </p:cNvPicPr>
+          <p:nvPr/>
+        </p:nvPicPr>
+        <p:blipFill>
+          <a:blip r:embed="rId3">
+            <a:extLst>
+              <a:ext uri="{28A0092B-C50C-407E-A947-70E740481C1C}">
+                <a14:useLocalDpi xmlns:a14="http://schemas.microsoft.com/office/drawing/2010/main" val="0"/>
+              </a:ext>
+            </a:extLst>
+          </a:blip>
+          <a:stretch>
+            <a:fillRect/>
+          </a:stretch>
+        </p:blipFill>
+        <p:spPr>
+          <a:xfrm>
+            <a:off x="1" y="715616"/>
+            <a:ext cx="12192000" cy="6142384"/>
+          </a:xfrm>
+          <a:prstGeom prst="rect">
+            <a:avLst/>
+          </a:prstGeom>
+        </p:spPr>
+      </p:pic>
     </p:spTree>
     <p:extLst>
       <p:ext uri="{BB962C8B-B14F-4D97-AF65-F5344CB8AC3E}">
-        <p14:creationId xmlns:p14="http://schemas.microsoft.com/office/powerpoint/2010/main" val="522260827"/>
+        <p14:creationId xmlns:p14="http://schemas.microsoft.com/office/powerpoint/2010/main" val="1654231213"/>
       </p:ext>
     </p:extLst>
   </p:cSld>
@@ -7305,23 +9656,23 @@
         </p:nvSpPr>
         <p:spPr>
           <a:xfrm>
-            <a:off x="838200" y="219352"/>
-            <a:ext cx="10515600" cy="770654"/>
+            <a:off x="838200" y="206100"/>
+            <a:ext cx="10515600" cy="509517"/>
           </a:xfrm>
         </p:spPr>
         <p:txBody>
           <a:bodyPr>
-            <a:normAutofit/>
+            <a:normAutofit fontScale="90000"/>
           </a:bodyPr>
           <a:lstStyle/>
           <a:p>
             <a:r>
-              <a:rPr lang="en-IN" sz="4000" b="1" dirty="0">
+              <a:rPr lang="en-IN" sz="3200" b="1" dirty="0">
                 <a:solidFill>
                   <a:srgbClr val="002060"/>
                 </a:solidFill>
               </a:rPr>
-              <a:t>Active Structure</a:t>
+              <a:t>Requirements Model</a:t>
             </a:r>
           </a:p>
         </p:txBody>
@@ -7356,10 +9707,46 @@
           </a:prstGeom>
         </p:spPr>
       </p:pic>
+      <p:pic>
+        <p:nvPicPr>
+          <p:cNvPr id="5" name="Picture 4" descr="A screenshot of a cell phone&#10;&#10;Description automatically generated">
+            <a:extLst>
+              <a:ext uri="{FF2B5EF4-FFF2-40B4-BE49-F238E27FC236}">
+                <a16:creationId xmlns:a16="http://schemas.microsoft.com/office/drawing/2014/main" id="{9E0BB1F2-5CC3-471F-9056-D27C948BF451}"/>
+              </a:ext>
+            </a:extLst>
+          </p:cNvPr>
+          <p:cNvPicPr>
+            <a:picLocks noChangeAspect="1"/>
+          </p:cNvPicPr>
+          <p:nvPr/>
+        </p:nvPicPr>
+        <p:blipFill>
+          <a:blip r:embed="rId3">
+            <a:extLst>
+              <a:ext uri="{28A0092B-C50C-407E-A947-70E740481C1C}">
+                <a14:useLocalDpi xmlns:a14="http://schemas.microsoft.com/office/drawing/2010/main" val="0"/>
+              </a:ext>
+            </a:extLst>
+          </a:blip>
+          <a:stretch>
+            <a:fillRect/>
+          </a:stretch>
+        </p:blipFill>
+        <p:spPr>
+          <a:xfrm>
+            <a:off x="1974166" y="715617"/>
+            <a:ext cx="8243668" cy="6142382"/>
+          </a:xfrm>
+          <a:prstGeom prst="rect">
+            <a:avLst/>
+          </a:prstGeom>
+        </p:spPr>
+      </p:pic>
     </p:spTree>
     <p:extLst>
       <p:ext uri="{BB962C8B-B14F-4D97-AF65-F5344CB8AC3E}">
-        <p14:creationId xmlns:p14="http://schemas.microsoft.com/office/powerpoint/2010/main" val="2572804484"/>
+        <p14:creationId xmlns:p14="http://schemas.microsoft.com/office/powerpoint/2010/main" val="2106419532"/>
       </p:ext>
     </p:extLst>
   </p:cSld>

</xml_diff>